<commit_message>
update slides at airport
</commit_message>
<xml_diff>
--- a/rnaseq_workshop.pptx
+++ b/rnaseq_workshop.pptx
@@ -6,21 +6,24 @@
   </p:sldMasterIdLst>
   <p:sldIdLst>
     <p:sldId id="256" r:id="rId2"/>
-    <p:sldId id="263" r:id="rId3"/>
-    <p:sldId id="258" r:id="rId4"/>
-    <p:sldId id="259" r:id="rId5"/>
-    <p:sldId id="257" r:id="rId6"/>
-    <p:sldId id="265" r:id="rId7"/>
-    <p:sldId id="266" r:id="rId8"/>
-    <p:sldId id="267" r:id="rId9"/>
-    <p:sldId id="268" r:id="rId10"/>
-    <p:sldId id="269" r:id="rId11"/>
-    <p:sldId id="271" r:id="rId12"/>
-    <p:sldId id="260" r:id="rId13"/>
-    <p:sldId id="261" r:id="rId14"/>
-    <p:sldId id="262" r:id="rId15"/>
-    <p:sldId id="264" r:id="rId16"/>
-    <p:sldId id="270" r:id="rId17"/>
+    <p:sldId id="272" r:id="rId3"/>
+    <p:sldId id="263" r:id="rId4"/>
+    <p:sldId id="258" r:id="rId5"/>
+    <p:sldId id="259" r:id="rId6"/>
+    <p:sldId id="257" r:id="rId7"/>
+    <p:sldId id="265" r:id="rId8"/>
+    <p:sldId id="266" r:id="rId9"/>
+    <p:sldId id="267" r:id="rId10"/>
+    <p:sldId id="268" r:id="rId11"/>
+    <p:sldId id="273" r:id="rId12"/>
+    <p:sldId id="269" r:id="rId13"/>
+    <p:sldId id="271" r:id="rId14"/>
+    <p:sldId id="260" r:id="rId15"/>
+    <p:sldId id="261" r:id="rId16"/>
+    <p:sldId id="262" r:id="rId17"/>
+    <p:sldId id="264" r:id="rId18"/>
+    <p:sldId id="270" r:id="rId19"/>
+    <p:sldId id="274" r:id="rId20"/>
   </p:sldIdLst>
   <p:sldSz cx="9144000" cy="6858000" type="screen4x3"/>
   <p:notesSz cx="6858000" cy="9144000"/>
@@ -121,7 +124,7 @@
   </p:defaultTextStyle>
   <p:extLst>
     <p:ext uri="{EFAFB233-063F-42B5-8137-9DF3F51BA10A}">
-      <p15:sldGuideLst xmlns:p15="http://schemas.microsoft.com/office/powerpoint/2012/main" xmlns="">
+      <p15:sldGuideLst xmlns:p15="http://schemas.microsoft.com/office/powerpoint/2012/main">
         <p15:guide id="1" orient="horz" pos="2160">
           <p15:clr>
             <a:srgbClr val="A4A3A4"/>
@@ -269,7 +272,7 @@
           <a:p>
             <a:fld id="{DE72398D-FDD1-114A-8509-66EEBD17B15C}" type="datetimeFigureOut">
               <a:rPr lang="en-US" smtClean="0"/>
-              <a:t>4/25/17</a:t>
+              <a:t>4/26/17</a:t>
             </a:fld>
             <a:endParaRPr lang="en-US"/>
           </a:p>
@@ -439,7 +442,7 @@
           <a:p>
             <a:fld id="{DE72398D-FDD1-114A-8509-66EEBD17B15C}" type="datetimeFigureOut">
               <a:rPr lang="en-US" smtClean="0"/>
-              <a:t>4/25/17</a:t>
+              <a:t>4/26/17</a:t>
             </a:fld>
             <a:endParaRPr lang="en-US"/>
           </a:p>
@@ -619,7 +622,7 @@
           <a:p>
             <a:fld id="{DE72398D-FDD1-114A-8509-66EEBD17B15C}" type="datetimeFigureOut">
               <a:rPr lang="en-US" smtClean="0"/>
-              <a:t>4/25/17</a:t>
+              <a:t>4/26/17</a:t>
             </a:fld>
             <a:endParaRPr lang="en-US"/>
           </a:p>
@@ -789,7 +792,7 @@
           <a:p>
             <a:fld id="{DE72398D-FDD1-114A-8509-66EEBD17B15C}" type="datetimeFigureOut">
               <a:rPr lang="en-US" smtClean="0"/>
-              <a:t>4/25/17</a:t>
+              <a:t>4/26/17</a:t>
             </a:fld>
             <a:endParaRPr lang="en-US"/>
           </a:p>
@@ -1035,7 +1038,7 @@
           <a:p>
             <a:fld id="{DE72398D-FDD1-114A-8509-66EEBD17B15C}" type="datetimeFigureOut">
               <a:rPr lang="en-US" smtClean="0"/>
-              <a:t>4/25/17</a:t>
+              <a:t>4/26/17</a:t>
             </a:fld>
             <a:endParaRPr lang="en-US"/>
           </a:p>
@@ -1267,7 +1270,7 @@
           <a:p>
             <a:fld id="{DE72398D-FDD1-114A-8509-66EEBD17B15C}" type="datetimeFigureOut">
               <a:rPr lang="en-US" smtClean="0"/>
-              <a:t>4/25/17</a:t>
+              <a:t>4/26/17</a:t>
             </a:fld>
             <a:endParaRPr lang="en-US"/>
           </a:p>
@@ -1634,7 +1637,7 @@
           <a:p>
             <a:fld id="{DE72398D-FDD1-114A-8509-66EEBD17B15C}" type="datetimeFigureOut">
               <a:rPr lang="en-US" smtClean="0"/>
-              <a:t>4/25/17</a:t>
+              <a:t>4/26/17</a:t>
             </a:fld>
             <a:endParaRPr lang="en-US"/>
           </a:p>
@@ -1752,7 +1755,7 @@
           <a:p>
             <a:fld id="{DE72398D-FDD1-114A-8509-66EEBD17B15C}" type="datetimeFigureOut">
               <a:rPr lang="en-US" smtClean="0"/>
-              <a:t>4/25/17</a:t>
+              <a:t>4/26/17</a:t>
             </a:fld>
             <a:endParaRPr lang="en-US"/>
           </a:p>
@@ -1847,7 +1850,7 @@
           <a:p>
             <a:fld id="{DE72398D-FDD1-114A-8509-66EEBD17B15C}" type="datetimeFigureOut">
               <a:rPr lang="en-US" smtClean="0"/>
-              <a:t>4/25/17</a:t>
+              <a:t>4/26/17</a:t>
             </a:fld>
             <a:endParaRPr lang="en-US"/>
           </a:p>
@@ -2124,7 +2127,7 @@
           <a:p>
             <a:fld id="{DE72398D-FDD1-114A-8509-66EEBD17B15C}" type="datetimeFigureOut">
               <a:rPr lang="en-US" smtClean="0"/>
-              <a:t>4/25/17</a:t>
+              <a:t>4/26/17</a:t>
             </a:fld>
             <a:endParaRPr lang="en-US"/>
           </a:p>
@@ -2377,7 +2380,7 @@
           <a:p>
             <a:fld id="{DE72398D-FDD1-114A-8509-66EEBD17B15C}" type="datetimeFigureOut">
               <a:rPr lang="en-US" smtClean="0"/>
-              <a:t>4/25/17</a:t>
+              <a:t>4/26/17</a:t>
             </a:fld>
             <a:endParaRPr lang="en-US"/>
           </a:p>
@@ -2590,7 +2593,7 @@
           <a:p>
             <a:fld id="{DE72398D-FDD1-114A-8509-66EEBD17B15C}" type="datetimeFigureOut">
               <a:rPr lang="en-US" smtClean="0"/>
-              <a:t>4/25/17</a:t>
+              <a:t>4/26/17</a:t>
             </a:fld>
             <a:endParaRPr lang="en-US"/>
           </a:p>
@@ -3190,7 +3193,7 @@
   <p:timing>
     <p:tnLst>
       <p:par>
-        <p:cTn xmlns:p14="http://schemas.microsoft.com/office/powerpoint/2010/main" id="1" dur="indefinite" restart="never" nodeType="tmRoot"/>
+        <p:cTn id="1" dur="indefinite" restart="never" nodeType="tmRoot"/>
       </p:par>
     </p:tnLst>
   </p:timing>
@@ -3198,6 +3201,1179 @@
 </file>
 
 <file path=ppt/slides/slide10.xml><?xml version="1.0" encoding="utf-8"?>
+<p:sld xmlns:a="http://schemas.openxmlformats.org/drawingml/2006/main" xmlns:r="http://schemas.openxmlformats.org/officeDocument/2006/relationships" xmlns:p="http://schemas.openxmlformats.org/presentationml/2006/main">
+  <p:cSld>
+    <p:spTree>
+      <p:nvGrpSpPr>
+        <p:cNvPr id="1" name=""/>
+        <p:cNvGrpSpPr/>
+        <p:nvPr/>
+      </p:nvGrpSpPr>
+      <p:grpSpPr>
+        <a:xfrm>
+          <a:off x="0" y="0"/>
+          <a:ext cx="0" cy="0"/>
+          <a:chOff x="0" y="0"/>
+          <a:chExt cx="0" cy="0"/>
+        </a:xfrm>
+      </p:grpSpPr>
+      <p:pic>
+        <p:nvPicPr>
+          <p:cNvPr id="4" name="Picture 3"/>
+          <p:cNvPicPr>
+            <a:picLocks noChangeAspect="1"/>
+          </p:cNvPicPr>
+          <p:nvPr/>
+        </p:nvPicPr>
+        <p:blipFill>
+          <a:blip r:embed="rId2"/>
+          <a:stretch>
+            <a:fillRect/>
+          </a:stretch>
+        </p:blipFill>
+        <p:spPr>
+          <a:xfrm>
+            <a:off x="3859936" y="805304"/>
+            <a:ext cx="5284064" cy="5683364"/>
+          </a:xfrm>
+          <a:prstGeom prst="rect">
+            <a:avLst/>
+          </a:prstGeom>
+        </p:spPr>
+      </p:pic>
+      <p:sp>
+        <p:nvSpPr>
+          <p:cNvPr id="5" name="TextBox 4"/>
+          <p:cNvSpPr txBox="1"/>
+          <p:nvPr/>
+        </p:nvSpPr>
+        <p:spPr>
+          <a:xfrm>
+            <a:off x="7325290" y="6488668"/>
+            <a:ext cx="1818710" cy="369332"/>
+          </a:xfrm>
+          <a:prstGeom prst="rect">
+            <a:avLst/>
+          </a:prstGeom>
+          <a:noFill/>
+        </p:spPr>
+        <p:txBody>
+          <a:bodyPr wrap="square" rtlCol="0">
+            <a:spAutoFit/>
+          </a:bodyPr>
+          <a:lstStyle/>
+          <a:p>
+            <a:r>
+              <a:rPr lang="en-US" dirty="0" err="1" smtClean="0"/>
+              <a:t>Pachter</a:t>
+            </a:r>
+            <a:r>
+              <a:rPr lang="en-US" dirty="0" smtClean="0"/>
+              <a:t> 2011</a:t>
+            </a:r>
+            <a:endParaRPr lang="en-US" dirty="0"/>
+          </a:p>
+        </p:txBody>
+      </p:sp>
+      <p:graphicFrame>
+        <p:nvGraphicFramePr>
+          <p:cNvPr id="7" name="Table 6"/>
+          <p:cNvGraphicFramePr>
+            <a:graphicFrameLocks noGrp="1"/>
+          </p:cNvGraphicFramePr>
+          <p:nvPr>
+            <p:extLst>
+              <p:ext uri="{D42A27DB-BD31-4B8C-83A1-F6EECF244321}">
+                <p14:modId xmlns:p14="http://schemas.microsoft.com/office/powerpoint/2010/main" val="3744843095"/>
+              </p:ext>
+            </p:extLst>
+          </p:nvPr>
+        </p:nvGraphicFramePr>
+        <p:xfrm>
+          <a:off x="728262" y="3942808"/>
+          <a:ext cx="2646068" cy="2545860"/>
+        </p:xfrm>
+        <a:graphic>
+          <a:graphicData uri="http://schemas.openxmlformats.org/drawingml/2006/table">
+            <a:tbl>
+              <a:tblPr firstRow="1" bandRow="1">
+                <a:tableStyleId>{D03447BB-5D67-496B-8E87-E561075AD55C}</a:tableStyleId>
+              </a:tblPr>
+              <a:tblGrid>
+                <a:gridCol w="342560"/>
+                <a:gridCol w="767836"/>
+                <a:gridCol w="767836"/>
+                <a:gridCol w="767836"/>
+              </a:tblGrid>
+              <a:tr h="424310">
+                <a:tc>
+                  <a:txBody>
+                    <a:bodyPr/>
+                    <a:lstStyle/>
+                    <a:p>
+                      <a:pPr algn="ctr"/>
+                      <a:endParaRPr lang="en-US" sz="1800" dirty="0"/>
+                    </a:p>
+                  </a:txBody>
+                  <a:tcPr anchor="ctr"/>
+                </a:tc>
+                <a:tc>
+                  <a:txBody>
+                    <a:bodyPr/>
+                    <a:lstStyle/>
+                    <a:p>
+                      <a:pPr algn="ctr"/>
+                      <a:r>
+                        <a:rPr lang="en-US" sz="1800" dirty="0" smtClean="0">
+                          <a:solidFill>
+                            <a:srgbClr val="FF0000"/>
+                          </a:solidFill>
+                        </a:rPr>
+                        <a:t>red</a:t>
+                      </a:r>
+                      <a:endParaRPr lang="en-US" sz="1800" dirty="0">
+                        <a:solidFill>
+                          <a:srgbClr val="FF0000"/>
+                        </a:solidFill>
+                      </a:endParaRPr>
+                    </a:p>
+                  </a:txBody>
+                  <a:tcPr anchor="ctr"/>
+                </a:tc>
+                <a:tc>
+                  <a:txBody>
+                    <a:bodyPr/>
+                    <a:lstStyle/>
+                    <a:p>
+                      <a:pPr algn="ctr"/>
+                      <a:r>
+                        <a:rPr lang="en-US" sz="1800" dirty="0" smtClean="0">
+                          <a:solidFill>
+                            <a:srgbClr val="23FF06"/>
+                          </a:solidFill>
+                        </a:rPr>
+                        <a:t>green</a:t>
+                      </a:r>
+                      <a:endParaRPr lang="en-US" sz="1800" dirty="0">
+                        <a:solidFill>
+                          <a:srgbClr val="23FF06"/>
+                        </a:solidFill>
+                      </a:endParaRPr>
+                    </a:p>
+                  </a:txBody>
+                  <a:tcPr anchor="ctr"/>
+                </a:tc>
+                <a:tc>
+                  <a:txBody>
+                    <a:bodyPr/>
+                    <a:lstStyle/>
+                    <a:p>
+                      <a:pPr algn="ctr"/>
+                      <a:r>
+                        <a:rPr lang="en-US" sz="1800" dirty="0" smtClean="0">
+                          <a:solidFill>
+                            <a:srgbClr val="0000FF"/>
+                          </a:solidFill>
+                        </a:rPr>
+                        <a:t>blue</a:t>
+                      </a:r>
+                      <a:endParaRPr lang="en-US" sz="1800" dirty="0">
+                        <a:solidFill>
+                          <a:srgbClr val="0000FF"/>
+                        </a:solidFill>
+                      </a:endParaRPr>
+                    </a:p>
+                  </a:txBody>
+                  <a:tcPr anchor="ctr"/>
+                </a:tc>
+              </a:tr>
+              <a:tr h="424310">
+                <a:tc>
+                  <a:txBody>
+                    <a:bodyPr/>
+                    <a:lstStyle/>
+                    <a:p>
+                      <a:pPr algn="ctr"/>
+                      <a:r>
+                        <a:rPr lang="en-US" sz="1800" dirty="0" smtClean="0"/>
+                        <a:t>a</a:t>
+                      </a:r>
+                      <a:endParaRPr lang="en-US" sz="1800" dirty="0"/>
+                    </a:p>
+                  </a:txBody>
+                  <a:tcPr anchor="ctr"/>
+                </a:tc>
+                <a:tc>
+                  <a:txBody>
+                    <a:bodyPr/>
+                    <a:lstStyle/>
+                    <a:p>
+                      <a:pPr algn="ctr"/>
+                      <a:r>
+                        <a:rPr lang="en-US" sz="1800" dirty="0" smtClean="0">
+                          <a:solidFill>
+                            <a:srgbClr val="FF0000"/>
+                          </a:solidFill>
+                        </a:rPr>
+                        <a:t>0.467</a:t>
+                      </a:r>
+                      <a:endParaRPr lang="en-US" sz="1800" dirty="0">
+                        <a:solidFill>
+                          <a:srgbClr val="FF0000"/>
+                        </a:solidFill>
+                      </a:endParaRPr>
+                    </a:p>
+                  </a:txBody>
+                  <a:tcPr anchor="ctr"/>
+                </a:tc>
+                <a:tc>
+                  <a:txBody>
+                    <a:bodyPr/>
+                    <a:lstStyle/>
+                    <a:p>
+                      <a:pPr algn="ctr"/>
+                      <a:r>
+                        <a:rPr lang="en-US" sz="1800" dirty="0" smtClean="0">
+                          <a:solidFill>
+                            <a:srgbClr val="23FF06"/>
+                          </a:solidFill>
+                        </a:rPr>
+                        <a:t>0.267</a:t>
+                      </a:r>
+                      <a:endParaRPr lang="en-US" sz="1800" dirty="0">
+                        <a:solidFill>
+                          <a:srgbClr val="23FF06"/>
+                        </a:solidFill>
+                      </a:endParaRPr>
+                    </a:p>
+                  </a:txBody>
+                  <a:tcPr anchor="ctr"/>
+                </a:tc>
+                <a:tc>
+                  <a:txBody>
+                    <a:bodyPr/>
+                    <a:lstStyle/>
+                    <a:p>
+                      <a:pPr algn="ctr"/>
+                      <a:r>
+                        <a:rPr lang="en-US" sz="1800" dirty="0" smtClean="0">
+                          <a:solidFill>
+                            <a:srgbClr val="0000FF"/>
+                          </a:solidFill>
+                        </a:rPr>
+                        <a:t>0.267</a:t>
+                      </a:r>
+                      <a:endParaRPr lang="en-US" sz="1800" dirty="0">
+                        <a:solidFill>
+                          <a:srgbClr val="0000FF"/>
+                        </a:solidFill>
+                      </a:endParaRPr>
+                    </a:p>
+                  </a:txBody>
+                  <a:tcPr anchor="ctr"/>
+                </a:tc>
+              </a:tr>
+              <a:tr h="424310">
+                <a:tc>
+                  <a:txBody>
+                    <a:bodyPr/>
+                    <a:lstStyle/>
+                    <a:p>
+                      <a:pPr algn="ctr"/>
+                      <a:r>
+                        <a:rPr lang="en-US" sz="1800" dirty="0" smtClean="0"/>
+                        <a:t>b</a:t>
+                      </a:r>
+                      <a:endParaRPr lang="en-US" sz="1800" dirty="0"/>
+                    </a:p>
+                  </a:txBody>
+                  <a:tcPr anchor="ctr"/>
+                </a:tc>
+                <a:tc>
+                  <a:txBody>
+                    <a:bodyPr/>
+                    <a:lstStyle/>
+                    <a:p>
+                      <a:pPr algn="ctr"/>
+                      <a:r>
+                        <a:rPr lang="en-US" sz="1800" dirty="0" smtClean="0">
+                          <a:solidFill>
+                            <a:srgbClr val="FF0000"/>
+                          </a:solidFill>
+                        </a:rPr>
+                        <a:t>0</a:t>
+                      </a:r>
+                      <a:endParaRPr lang="en-US" sz="1800" dirty="0">
+                        <a:solidFill>
+                          <a:srgbClr val="FF0000"/>
+                        </a:solidFill>
+                      </a:endParaRPr>
+                    </a:p>
+                  </a:txBody>
+                  <a:tcPr anchor="ctr"/>
+                </a:tc>
+                <a:tc>
+                  <a:txBody>
+                    <a:bodyPr/>
+                    <a:lstStyle/>
+                    <a:p>
+                      <a:pPr algn="ctr"/>
+                      <a:r>
+                        <a:rPr lang="en-US" sz="1800" dirty="0" smtClean="0">
+                          <a:solidFill>
+                            <a:srgbClr val="23FF06"/>
+                          </a:solidFill>
+                        </a:rPr>
+                        <a:t>1/2</a:t>
+                      </a:r>
+                      <a:endParaRPr lang="en-US" sz="1800" dirty="0">
+                        <a:solidFill>
+                          <a:srgbClr val="23FF06"/>
+                        </a:solidFill>
+                      </a:endParaRPr>
+                    </a:p>
+                  </a:txBody>
+                  <a:tcPr anchor="ctr"/>
+                </a:tc>
+                <a:tc>
+                  <a:txBody>
+                    <a:bodyPr/>
+                    <a:lstStyle/>
+                    <a:p>
+                      <a:pPr algn="ctr"/>
+                      <a:r>
+                        <a:rPr lang="en-US" sz="1800" dirty="0" smtClean="0">
+                          <a:solidFill>
+                            <a:srgbClr val="0000FF"/>
+                          </a:solidFill>
+                        </a:rPr>
+                        <a:t>1/2</a:t>
+                      </a:r>
+                      <a:endParaRPr lang="en-US" sz="1800" dirty="0">
+                        <a:solidFill>
+                          <a:srgbClr val="0000FF"/>
+                        </a:solidFill>
+                      </a:endParaRPr>
+                    </a:p>
+                  </a:txBody>
+                  <a:tcPr anchor="ctr"/>
+                </a:tc>
+              </a:tr>
+              <a:tr h="424310">
+                <a:tc>
+                  <a:txBody>
+                    <a:bodyPr/>
+                    <a:lstStyle/>
+                    <a:p>
+                      <a:pPr algn="ctr"/>
+                      <a:r>
+                        <a:rPr lang="en-US" sz="1800" dirty="0" smtClean="0"/>
+                        <a:t>c</a:t>
+                      </a:r>
+                      <a:endParaRPr lang="en-US" sz="1800" dirty="0"/>
+                    </a:p>
+                  </a:txBody>
+                  <a:tcPr anchor="ctr"/>
+                </a:tc>
+                <a:tc>
+                  <a:txBody>
+                    <a:bodyPr/>
+                    <a:lstStyle/>
+                    <a:p>
+                      <a:pPr algn="ctr"/>
+                      <a:r>
+                        <a:rPr lang="en-US" sz="1800" dirty="0" smtClean="0">
+                          <a:solidFill>
+                            <a:srgbClr val="FF0000"/>
+                          </a:solidFill>
+                        </a:rPr>
+                        <a:t>0.636</a:t>
+                      </a:r>
+                      <a:endParaRPr lang="en-US" sz="1800" dirty="0">
+                        <a:solidFill>
+                          <a:srgbClr val="FF0000"/>
+                        </a:solidFill>
+                      </a:endParaRPr>
+                    </a:p>
+                  </a:txBody>
+                  <a:tcPr anchor="ctr"/>
+                </a:tc>
+                <a:tc>
+                  <a:txBody>
+                    <a:bodyPr/>
+                    <a:lstStyle/>
+                    <a:p>
+                      <a:pPr algn="ctr"/>
+                      <a:r>
+                        <a:rPr lang="en-US" sz="1800" dirty="0" smtClean="0">
+                          <a:solidFill>
+                            <a:srgbClr val="23FF06"/>
+                          </a:solidFill>
+                        </a:rPr>
+                        <a:t>0</a:t>
+                      </a:r>
+                      <a:endParaRPr lang="en-US" sz="1800" dirty="0">
+                        <a:solidFill>
+                          <a:srgbClr val="23FF06"/>
+                        </a:solidFill>
+                      </a:endParaRPr>
+                    </a:p>
+                  </a:txBody>
+                  <a:tcPr anchor="ctr"/>
+                </a:tc>
+                <a:tc>
+                  <a:txBody>
+                    <a:bodyPr/>
+                    <a:lstStyle/>
+                    <a:p>
+                      <a:pPr algn="ctr"/>
+                      <a:r>
+                        <a:rPr lang="en-US" sz="1800" dirty="0" smtClean="0">
+                          <a:solidFill>
+                            <a:srgbClr val="0000FF"/>
+                          </a:solidFill>
+                        </a:rPr>
+                        <a:t>0.364</a:t>
+                      </a:r>
+                      <a:endParaRPr lang="en-US" sz="1800" dirty="0">
+                        <a:solidFill>
+                          <a:srgbClr val="0000FF"/>
+                        </a:solidFill>
+                      </a:endParaRPr>
+                    </a:p>
+                  </a:txBody>
+                  <a:tcPr anchor="ctr"/>
+                </a:tc>
+              </a:tr>
+              <a:tr h="424310">
+                <a:tc>
+                  <a:txBody>
+                    <a:bodyPr/>
+                    <a:lstStyle/>
+                    <a:p>
+                      <a:pPr algn="ctr"/>
+                      <a:r>
+                        <a:rPr lang="en-US" sz="1800" dirty="0" smtClean="0"/>
+                        <a:t>d</a:t>
+                      </a:r>
+                      <a:endParaRPr lang="en-US" sz="1800" dirty="0"/>
+                    </a:p>
+                  </a:txBody>
+                  <a:tcPr anchor="ctr"/>
+                </a:tc>
+                <a:tc>
+                  <a:txBody>
+                    <a:bodyPr/>
+                    <a:lstStyle/>
+                    <a:p>
+                      <a:pPr algn="ctr"/>
+                      <a:r>
+                        <a:rPr lang="en-US" sz="1800" dirty="0" smtClean="0">
+                          <a:solidFill>
+                            <a:srgbClr val="FF0000"/>
+                          </a:solidFill>
+                        </a:rPr>
+                        <a:t>1</a:t>
+                      </a:r>
+                      <a:endParaRPr lang="en-US" sz="1800" dirty="0">
+                        <a:solidFill>
+                          <a:srgbClr val="FF0000"/>
+                        </a:solidFill>
+                      </a:endParaRPr>
+                    </a:p>
+                  </a:txBody>
+                  <a:tcPr anchor="ctr"/>
+                </a:tc>
+                <a:tc>
+                  <a:txBody>
+                    <a:bodyPr/>
+                    <a:lstStyle/>
+                    <a:p>
+                      <a:pPr algn="ctr"/>
+                      <a:r>
+                        <a:rPr lang="en-US" sz="1800" dirty="0" smtClean="0">
+                          <a:solidFill>
+                            <a:srgbClr val="23FF06"/>
+                          </a:solidFill>
+                        </a:rPr>
+                        <a:t>0</a:t>
+                      </a:r>
+                      <a:endParaRPr lang="en-US" sz="1800" dirty="0">
+                        <a:solidFill>
+                          <a:srgbClr val="23FF06"/>
+                        </a:solidFill>
+                      </a:endParaRPr>
+                    </a:p>
+                  </a:txBody>
+                  <a:tcPr anchor="ctr"/>
+                </a:tc>
+                <a:tc>
+                  <a:txBody>
+                    <a:bodyPr/>
+                    <a:lstStyle/>
+                    <a:p>
+                      <a:pPr algn="ctr"/>
+                      <a:r>
+                        <a:rPr lang="en-US" sz="1800" dirty="0" smtClean="0">
+                          <a:solidFill>
+                            <a:srgbClr val="0000FF"/>
+                          </a:solidFill>
+                        </a:rPr>
+                        <a:t>0</a:t>
+                      </a:r>
+                      <a:endParaRPr lang="en-US" sz="1800" dirty="0">
+                        <a:solidFill>
+                          <a:srgbClr val="0000FF"/>
+                        </a:solidFill>
+                      </a:endParaRPr>
+                    </a:p>
+                  </a:txBody>
+                  <a:tcPr anchor="ctr"/>
+                </a:tc>
+              </a:tr>
+              <a:tr h="424310">
+                <a:tc>
+                  <a:txBody>
+                    <a:bodyPr/>
+                    <a:lstStyle/>
+                    <a:p>
+                      <a:pPr algn="ctr"/>
+                      <a:r>
+                        <a:rPr lang="en-US" sz="1800" dirty="0" smtClean="0"/>
+                        <a:t>e</a:t>
+                      </a:r>
+                      <a:endParaRPr lang="en-US" sz="1800" dirty="0"/>
+                    </a:p>
+                  </a:txBody>
+                  <a:tcPr anchor="ctr"/>
+                </a:tc>
+                <a:tc>
+                  <a:txBody>
+                    <a:bodyPr/>
+                    <a:lstStyle/>
+                    <a:p>
+                      <a:pPr algn="ctr"/>
+                      <a:r>
+                        <a:rPr lang="en-US" sz="1800" dirty="0" smtClean="0">
+                          <a:solidFill>
+                            <a:srgbClr val="FF0000"/>
+                          </a:solidFill>
+                        </a:rPr>
+                        <a:t>0.636</a:t>
+                      </a:r>
+                      <a:endParaRPr lang="en-US" sz="1800" dirty="0">
+                        <a:solidFill>
+                          <a:srgbClr val="FF0000"/>
+                        </a:solidFill>
+                      </a:endParaRPr>
+                    </a:p>
+                  </a:txBody>
+                  <a:tcPr anchor="ctr"/>
+                </a:tc>
+                <a:tc>
+                  <a:txBody>
+                    <a:bodyPr/>
+                    <a:lstStyle/>
+                    <a:p>
+                      <a:pPr algn="ctr"/>
+                      <a:r>
+                        <a:rPr lang="en-US" sz="1800" dirty="0" smtClean="0">
+                          <a:solidFill>
+                            <a:srgbClr val="23FF06"/>
+                          </a:solidFill>
+                        </a:rPr>
+                        <a:t>0.364</a:t>
+                      </a:r>
+                      <a:endParaRPr lang="en-US" sz="1800" dirty="0">
+                        <a:solidFill>
+                          <a:srgbClr val="23FF06"/>
+                        </a:solidFill>
+                      </a:endParaRPr>
+                    </a:p>
+                  </a:txBody>
+                  <a:tcPr anchor="ctr"/>
+                </a:tc>
+                <a:tc>
+                  <a:txBody>
+                    <a:bodyPr/>
+                    <a:lstStyle/>
+                    <a:p>
+                      <a:pPr algn="ctr"/>
+                      <a:r>
+                        <a:rPr lang="en-US" sz="1800" dirty="0" smtClean="0">
+                          <a:solidFill>
+                            <a:srgbClr val="0000FF"/>
+                          </a:solidFill>
+                        </a:rPr>
+                        <a:t>0</a:t>
+                      </a:r>
+                      <a:endParaRPr lang="en-US" sz="1800" dirty="0">
+                        <a:solidFill>
+                          <a:srgbClr val="0000FF"/>
+                        </a:solidFill>
+                      </a:endParaRPr>
+                    </a:p>
+                  </a:txBody>
+                  <a:tcPr anchor="ctr"/>
+                </a:tc>
+              </a:tr>
+            </a:tbl>
+          </a:graphicData>
+        </a:graphic>
+      </p:graphicFrame>
+      <p:graphicFrame>
+        <p:nvGraphicFramePr>
+          <p:cNvPr id="9" name="Table 8"/>
+          <p:cNvGraphicFramePr>
+            <a:graphicFrameLocks noGrp="1"/>
+          </p:cNvGraphicFramePr>
+          <p:nvPr>
+            <p:extLst>
+              <p:ext uri="{D42A27DB-BD31-4B8C-83A1-F6EECF244321}">
+                <p14:modId xmlns:p14="http://schemas.microsoft.com/office/powerpoint/2010/main" val="3276923398"/>
+              </p:ext>
+            </p:extLst>
+          </p:nvPr>
+        </p:nvGraphicFramePr>
+        <p:xfrm>
+          <a:off x="1082278" y="2715720"/>
+          <a:ext cx="2278608" cy="848620"/>
+        </p:xfrm>
+        <a:graphic>
+          <a:graphicData uri="http://schemas.openxmlformats.org/drawingml/2006/table">
+            <a:tbl>
+              <a:tblPr firstRow="1" bandRow="1">
+                <a:tableStyleId>{E929F9F4-4A8F-4326-A1B4-22849713DDAB}</a:tableStyleId>
+              </a:tblPr>
+              <a:tblGrid>
+                <a:gridCol w="759536"/>
+                <a:gridCol w="759536"/>
+                <a:gridCol w="759536"/>
+              </a:tblGrid>
+              <a:tr h="424310">
+                <a:tc>
+                  <a:txBody>
+                    <a:bodyPr/>
+                    <a:lstStyle/>
+                    <a:p>
+                      <a:pPr algn="ctr"/>
+                      <a:r>
+                        <a:rPr lang="en-US" sz="1800" dirty="0" smtClean="0">
+                          <a:solidFill>
+                            <a:srgbClr val="FF0000"/>
+                          </a:solidFill>
+                        </a:rPr>
+                        <a:t>red</a:t>
+                      </a:r>
+                      <a:endParaRPr lang="en-US" sz="1800" dirty="0">
+                        <a:solidFill>
+                          <a:srgbClr val="FF0000"/>
+                        </a:solidFill>
+                      </a:endParaRPr>
+                    </a:p>
+                  </a:txBody>
+                  <a:tcPr anchor="ctr"/>
+                </a:tc>
+                <a:tc>
+                  <a:txBody>
+                    <a:bodyPr/>
+                    <a:lstStyle/>
+                    <a:p>
+                      <a:pPr algn="ctr"/>
+                      <a:r>
+                        <a:rPr lang="en-US" sz="1800" dirty="0" smtClean="0">
+                          <a:solidFill>
+                            <a:srgbClr val="23FF06"/>
+                          </a:solidFill>
+                        </a:rPr>
+                        <a:t>green</a:t>
+                      </a:r>
+                      <a:endParaRPr lang="en-US" sz="1800" dirty="0">
+                        <a:solidFill>
+                          <a:srgbClr val="23FF06"/>
+                        </a:solidFill>
+                      </a:endParaRPr>
+                    </a:p>
+                  </a:txBody>
+                  <a:tcPr anchor="ctr"/>
+                </a:tc>
+                <a:tc>
+                  <a:txBody>
+                    <a:bodyPr/>
+                    <a:lstStyle/>
+                    <a:p>
+                      <a:pPr algn="ctr"/>
+                      <a:r>
+                        <a:rPr lang="en-US" sz="1800" dirty="0" smtClean="0">
+                          <a:solidFill>
+                            <a:srgbClr val="0000FF"/>
+                          </a:solidFill>
+                        </a:rPr>
+                        <a:t>blue</a:t>
+                      </a:r>
+                      <a:endParaRPr lang="en-US" sz="1800" dirty="0">
+                        <a:solidFill>
+                          <a:srgbClr val="0000FF"/>
+                        </a:solidFill>
+                      </a:endParaRPr>
+                    </a:p>
+                  </a:txBody>
+                  <a:tcPr anchor="ctr"/>
+                </a:tc>
+              </a:tr>
+              <a:tr h="424310">
+                <a:tc>
+                  <a:txBody>
+                    <a:bodyPr/>
+                    <a:lstStyle/>
+                    <a:p>
+                      <a:pPr algn="ctr"/>
+                      <a:r>
+                        <a:rPr lang="en-US" sz="1800" dirty="0" smtClean="0">
+                          <a:solidFill>
+                            <a:srgbClr val="FF0000"/>
+                          </a:solidFill>
+                        </a:rPr>
+                        <a:t>0.467</a:t>
+                      </a:r>
+                      <a:endParaRPr lang="en-US" sz="1800" dirty="0">
+                        <a:solidFill>
+                          <a:srgbClr val="FF0000"/>
+                        </a:solidFill>
+                      </a:endParaRPr>
+                    </a:p>
+                  </a:txBody>
+                  <a:tcPr anchor="ctr"/>
+                </a:tc>
+                <a:tc>
+                  <a:txBody>
+                    <a:bodyPr/>
+                    <a:lstStyle/>
+                    <a:p>
+                      <a:pPr algn="ctr"/>
+                      <a:r>
+                        <a:rPr lang="en-US" sz="1800" dirty="0" smtClean="0">
+                          <a:solidFill>
+                            <a:srgbClr val="23FF06"/>
+                          </a:solidFill>
+                        </a:rPr>
+                        <a:t>0.267</a:t>
+                      </a:r>
+                      <a:endParaRPr lang="en-US" sz="1800" dirty="0">
+                        <a:solidFill>
+                          <a:srgbClr val="23FF06"/>
+                        </a:solidFill>
+                      </a:endParaRPr>
+                    </a:p>
+                  </a:txBody>
+                  <a:tcPr anchor="ctr"/>
+                </a:tc>
+                <a:tc>
+                  <a:txBody>
+                    <a:bodyPr/>
+                    <a:lstStyle/>
+                    <a:p>
+                      <a:pPr algn="ctr"/>
+                      <a:r>
+                        <a:rPr lang="en-US" sz="1800" dirty="0" smtClean="0">
+                          <a:solidFill>
+                            <a:srgbClr val="0000FF"/>
+                          </a:solidFill>
+                        </a:rPr>
+                        <a:t>0.267</a:t>
+                      </a:r>
+                      <a:endParaRPr lang="en-US" sz="1800" dirty="0">
+                        <a:solidFill>
+                          <a:srgbClr val="0000FF"/>
+                        </a:solidFill>
+                      </a:endParaRPr>
+                    </a:p>
+                  </a:txBody>
+                  <a:tcPr anchor="ctr"/>
+                </a:tc>
+              </a:tr>
+            </a:tbl>
+          </a:graphicData>
+        </a:graphic>
+      </p:graphicFrame>
+      <p:sp>
+        <p:nvSpPr>
+          <p:cNvPr id="10" name="TextBox 9"/>
+          <p:cNvSpPr txBox="1"/>
+          <p:nvPr/>
+        </p:nvSpPr>
+        <p:spPr>
+          <a:xfrm>
+            <a:off x="0" y="2346388"/>
+            <a:ext cx="2980353" cy="369332"/>
+          </a:xfrm>
+          <a:prstGeom prst="rect">
+            <a:avLst/>
+          </a:prstGeom>
+          <a:noFill/>
+        </p:spPr>
+        <p:txBody>
+          <a:bodyPr wrap="none" rtlCol="0">
+            <a:spAutoFit/>
+          </a:bodyPr>
+          <a:lstStyle/>
+          <a:p>
+            <a:r>
+              <a:rPr lang="en-US" dirty="0" smtClean="0"/>
+              <a:t>Transcript relative abundance</a:t>
+            </a:r>
+            <a:endParaRPr lang="en-US" dirty="0"/>
+          </a:p>
+        </p:txBody>
+      </p:sp>
+      <p:sp>
+        <p:nvSpPr>
+          <p:cNvPr id="11" name="TextBox 10"/>
+          <p:cNvSpPr txBox="1"/>
+          <p:nvPr/>
+        </p:nvSpPr>
+        <p:spPr>
+          <a:xfrm>
+            <a:off x="0" y="3561644"/>
+            <a:ext cx="4045812" cy="369332"/>
+          </a:xfrm>
+          <a:prstGeom prst="rect">
+            <a:avLst/>
+          </a:prstGeom>
+          <a:noFill/>
+        </p:spPr>
+        <p:txBody>
+          <a:bodyPr wrap="none" rtlCol="0">
+            <a:spAutoFit/>
+          </a:bodyPr>
+          <a:lstStyle/>
+          <a:p>
+            <a:r>
+              <a:rPr lang="en-US" dirty="0" smtClean="0"/>
+              <a:t>Probability of read assigning to transcript</a:t>
+            </a:r>
+            <a:endParaRPr lang="en-US" dirty="0"/>
+          </a:p>
+        </p:txBody>
+      </p:sp>
+      <p:sp>
+        <p:nvSpPr>
+          <p:cNvPr id="15" name="Title 1"/>
+          <p:cNvSpPr>
+            <a:spLocks noGrp="1"/>
+          </p:cNvSpPr>
+          <p:nvPr>
+            <p:ph type="title"/>
+          </p:nvPr>
+        </p:nvSpPr>
+        <p:spPr>
+          <a:xfrm>
+            <a:off x="102462" y="0"/>
+            <a:ext cx="7886700" cy="1325563"/>
+          </a:xfrm>
+        </p:spPr>
+        <p:txBody>
+          <a:bodyPr>
+            <a:normAutofit/>
+          </a:bodyPr>
+          <a:lstStyle/>
+          <a:p>
+            <a:pPr algn="l"/>
+            <a:r>
+              <a:rPr lang="en-US" dirty="0" smtClean="0"/>
+              <a:t>Update read assignment</a:t>
+            </a:r>
+            <a:endParaRPr lang="en-US" dirty="0"/>
+          </a:p>
+        </p:txBody>
+      </p:sp>
+      <p:sp>
+        <p:nvSpPr>
+          <p:cNvPr id="17" name="Rectangle 16"/>
+          <p:cNvSpPr/>
+          <p:nvPr/>
+        </p:nvSpPr>
+        <p:spPr>
+          <a:xfrm>
+            <a:off x="6325314" y="2335376"/>
+            <a:ext cx="2017128" cy="1263624"/>
+          </a:xfrm>
+          <a:prstGeom prst="rect">
+            <a:avLst/>
+          </a:prstGeom>
+          <a:noFill/>
+          <a:ln w="28575" cmpd="sng">
+            <a:solidFill>
+              <a:srgbClr val="FF6600"/>
+            </a:solidFill>
+          </a:ln>
+          <a:effectLst/>
+        </p:spPr>
+        <p:style>
+          <a:lnRef idx="1">
+            <a:schemeClr val="accent1"/>
+          </a:lnRef>
+          <a:fillRef idx="3">
+            <a:schemeClr val="accent1"/>
+          </a:fillRef>
+          <a:effectRef idx="2">
+            <a:schemeClr val="accent1"/>
+          </a:effectRef>
+          <a:fontRef idx="minor">
+            <a:schemeClr val="lt1"/>
+          </a:fontRef>
+        </p:style>
+        <p:txBody>
+          <a:bodyPr rtlCol="0" anchor="ctr"/>
+          <a:lstStyle/>
+          <a:p>
+            <a:pPr algn="ctr"/>
+            <a:endParaRPr lang="en-US"/>
+          </a:p>
+        </p:txBody>
+      </p:sp>
+      <p:sp>
+        <p:nvSpPr>
+          <p:cNvPr id="12" name="Rectangle 11"/>
+          <p:cNvSpPr/>
+          <p:nvPr/>
+        </p:nvSpPr>
+        <p:spPr>
+          <a:xfrm>
+            <a:off x="4038972" y="3803374"/>
+            <a:ext cx="4455671" cy="2632050"/>
+          </a:xfrm>
+          <a:prstGeom prst="rect">
+            <a:avLst/>
+          </a:prstGeom>
+          <a:solidFill>
+            <a:schemeClr val="bg1"/>
+          </a:solidFill>
+          <a:ln>
+            <a:noFill/>
+          </a:ln>
+        </p:spPr>
+        <p:style>
+          <a:lnRef idx="2">
+            <a:schemeClr val="accent1">
+              <a:shade val="50000"/>
+            </a:schemeClr>
+          </a:lnRef>
+          <a:fillRef idx="1">
+            <a:schemeClr val="accent1"/>
+          </a:fillRef>
+          <a:effectRef idx="0">
+            <a:schemeClr val="accent1"/>
+          </a:effectRef>
+          <a:fontRef idx="minor">
+            <a:schemeClr val="lt1"/>
+          </a:fontRef>
+        </p:style>
+        <p:txBody>
+          <a:bodyPr rtlCol="0" anchor="ctr"/>
+          <a:lstStyle/>
+          <a:p>
+            <a:pPr algn="ctr"/>
+            <a:endParaRPr lang="en-US"/>
+          </a:p>
+        </p:txBody>
+      </p:sp>
+      <p:sp>
+        <p:nvSpPr>
+          <p:cNvPr id="13" name="Rectangle 12"/>
+          <p:cNvSpPr/>
+          <p:nvPr/>
+        </p:nvSpPr>
+        <p:spPr>
+          <a:xfrm>
+            <a:off x="5211744" y="3302251"/>
+            <a:ext cx="1058483" cy="1002246"/>
+          </a:xfrm>
+          <a:prstGeom prst="rect">
+            <a:avLst/>
+          </a:prstGeom>
+          <a:solidFill>
+            <a:schemeClr val="bg1"/>
+          </a:solidFill>
+          <a:ln>
+            <a:noFill/>
+          </a:ln>
+        </p:spPr>
+        <p:style>
+          <a:lnRef idx="2">
+            <a:schemeClr val="accent1">
+              <a:shade val="50000"/>
+            </a:schemeClr>
+          </a:lnRef>
+          <a:fillRef idx="1">
+            <a:schemeClr val="accent1"/>
+          </a:fillRef>
+          <a:effectRef idx="0">
+            <a:schemeClr val="accent1"/>
+          </a:effectRef>
+          <a:fontRef idx="minor">
+            <a:schemeClr val="lt1"/>
+          </a:fontRef>
+        </p:style>
+        <p:txBody>
+          <a:bodyPr rtlCol="0" anchor="ctr"/>
+          <a:lstStyle/>
+          <a:p>
+            <a:pPr algn="ctr"/>
+            <a:endParaRPr lang="en-US"/>
+          </a:p>
+        </p:txBody>
+      </p:sp>
+      <p:sp>
+        <p:nvSpPr>
+          <p:cNvPr id="16" name="Rectangle 15"/>
+          <p:cNvSpPr/>
+          <p:nvPr/>
+        </p:nvSpPr>
+        <p:spPr>
+          <a:xfrm>
+            <a:off x="0" y="3599000"/>
+            <a:ext cx="4045812" cy="3150044"/>
+          </a:xfrm>
+          <a:prstGeom prst="rect">
+            <a:avLst/>
+          </a:prstGeom>
+          <a:noFill/>
+          <a:ln w="28575" cmpd="sng">
+            <a:solidFill>
+              <a:srgbClr val="FF6600"/>
+            </a:solidFill>
+          </a:ln>
+          <a:effectLst/>
+        </p:spPr>
+        <p:style>
+          <a:lnRef idx="1">
+            <a:schemeClr val="accent1"/>
+          </a:lnRef>
+          <a:fillRef idx="3">
+            <a:schemeClr val="accent1"/>
+          </a:fillRef>
+          <a:effectRef idx="2">
+            <a:schemeClr val="accent1"/>
+          </a:effectRef>
+          <a:fontRef idx="minor">
+            <a:schemeClr val="lt1"/>
+          </a:fontRef>
+        </p:style>
+        <p:txBody>
+          <a:bodyPr rtlCol="0" anchor="ctr"/>
+          <a:lstStyle/>
+          <a:p>
+            <a:pPr algn="ctr"/>
+            <a:endParaRPr lang="en-US"/>
+          </a:p>
+        </p:txBody>
+      </p:sp>
+    </p:spTree>
+    <p:extLst>
+      <p:ext uri="{BB962C8B-B14F-4D97-AF65-F5344CB8AC3E}">
+        <p14:creationId xmlns:p14="http://schemas.microsoft.com/office/powerpoint/2010/main" val="2433799354"/>
+      </p:ext>
+    </p:extLst>
+  </p:cSld>
+  <p:clrMapOvr>
+    <a:masterClrMapping/>
+  </p:clrMapOvr>
+  <p:timing>
+    <p:tnLst>
+      <p:par>
+        <p:cTn id="1" dur="indefinite" restart="never" nodeType="tmRoot"/>
+      </p:par>
+    </p:tnLst>
+  </p:timing>
+</p:sld>
+</file>
+
+<file path=ppt/slides/slide11.xml><?xml version="1.0" encoding="utf-8"?>
+<p:sld xmlns:a="http://schemas.openxmlformats.org/drawingml/2006/main" xmlns:r="http://schemas.openxmlformats.org/officeDocument/2006/relationships" xmlns:p="http://schemas.openxmlformats.org/presentationml/2006/main">
+  <p:cSld>
+    <p:spTree>
+      <p:nvGrpSpPr>
+        <p:cNvPr id="1" name=""/>
+        <p:cNvGrpSpPr/>
+        <p:nvPr/>
+      </p:nvGrpSpPr>
+      <p:grpSpPr>
+        <a:xfrm>
+          <a:off x="0" y="0"/>
+          <a:ext cx="0" cy="0"/>
+          <a:chOff x="0" y="0"/>
+          <a:chExt cx="0" cy="0"/>
+        </a:xfrm>
+      </p:grpSpPr>
+      <p:sp>
+        <p:nvSpPr>
+          <p:cNvPr id="2" name="Title 1"/>
+          <p:cNvSpPr>
+            <a:spLocks noGrp="1"/>
+          </p:cNvSpPr>
+          <p:nvPr>
+            <p:ph type="title"/>
+          </p:nvPr>
+        </p:nvSpPr>
+        <p:spPr/>
+        <p:txBody>
+          <a:bodyPr/>
+          <a:lstStyle/>
+          <a:p>
+            <a:r>
+              <a:rPr lang="en-US" dirty="0" smtClean="0"/>
+              <a:t>Go on and on</a:t>
+            </a:r>
+            <a:endParaRPr lang="en-US" dirty="0"/>
+          </a:p>
+        </p:txBody>
+      </p:sp>
+      <p:pic>
+        <p:nvPicPr>
+          <p:cNvPr id="4" name="Picture 3"/>
+          <p:cNvPicPr>
+            <a:picLocks noChangeAspect="1"/>
+          </p:cNvPicPr>
+          <p:nvPr/>
+        </p:nvPicPr>
+        <p:blipFill>
+          <a:blip r:embed="rId2"/>
+          <a:stretch>
+            <a:fillRect/>
+          </a:stretch>
+        </p:blipFill>
+        <p:spPr>
+          <a:xfrm>
+            <a:off x="3859936" y="805304"/>
+            <a:ext cx="5284064" cy="5683364"/>
+          </a:xfrm>
+          <a:prstGeom prst="rect">
+            <a:avLst/>
+          </a:prstGeom>
+        </p:spPr>
+      </p:pic>
+    </p:spTree>
+    <p:extLst>
+      <p:ext uri="{BB962C8B-B14F-4D97-AF65-F5344CB8AC3E}">
+        <p14:creationId xmlns:p14="http://schemas.microsoft.com/office/powerpoint/2010/main" val="1899982119"/>
+      </p:ext>
+    </p:extLst>
+  </p:cSld>
+  <p:clrMapOvr>
+    <a:masterClrMapping/>
+  </p:clrMapOvr>
+  <p:timing>
+    <p:tnLst>
+      <p:par>
+        <p:cTn id="1" dur="indefinite" restart="never" nodeType="tmRoot"/>
+      </p:par>
+    </p:tnLst>
+  </p:timing>
+</p:sld>
+</file>
+
+<file path=ppt/slides/slide12.xml><?xml version="1.0" encoding="utf-8"?>
 <p:sld xmlns:a="http://schemas.openxmlformats.org/drawingml/2006/main" xmlns:r="http://schemas.openxmlformats.org/officeDocument/2006/relationships" xmlns:p="http://schemas.openxmlformats.org/presentationml/2006/main">
   <p:cSld>
     <p:spTree>
@@ -3234,16 +4410,40 @@
                 <a:latin typeface="Calibri Light"/>
                 <a:cs typeface="Calibri Light"/>
               </a:rPr>
-              <a:t>Well, until we converge (Improvement in log likelihood is sufficiently small).</a:t>
-            </a:r>
-          </a:p>
-          <a:p>
+              <a:t>Well, until we converge (Improvement in log likelihood is sufficiently small</a:t>
+            </a:r>
             <a:r>
               <a:rPr lang="en-US" dirty="0" smtClean="0">
                 <a:latin typeface="Calibri Light"/>
                 <a:cs typeface="Calibri Light"/>
               </a:rPr>
-              <a:t>This way, we are </a:t>
+              <a:t>)</a:t>
+            </a:r>
+          </a:p>
+          <a:p>
+            <a:pPr lvl="1"/>
+            <a:r>
+              <a:rPr lang="en-US" dirty="0" smtClean="0">
+                <a:latin typeface="Calibri Light"/>
+                <a:cs typeface="Calibri Light"/>
+              </a:rPr>
+              <a:t>The transcript abundance estimates will change very little if you were to continue</a:t>
+            </a:r>
+          </a:p>
+          <a:p>
+            <a:r>
+              <a:rPr lang="en-US" dirty="0" smtClean="0">
+                <a:latin typeface="Calibri Light"/>
+                <a:cs typeface="Calibri Light"/>
+              </a:rPr>
+              <a:t>This </a:t>
+            </a:r>
+            <a:r>
+              <a:rPr lang="en-US" dirty="0" smtClean="0">
+                <a:latin typeface="Calibri Light"/>
+                <a:cs typeface="Calibri Light"/>
+              </a:rPr>
+              <a:t>way, we are </a:t>
             </a:r>
             <a:r>
               <a:rPr lang="en-US" u="sng" dirty="0" smtClean="0">
@@ -3285,7 +4485,41 @@
                 <a:latin typeface="Calibri Light"/>
                 <a:cs typeface="Calibri Light"/>
               </a:rPr>
-              <a:t> transcript abundance and read assignment</a:t>
+              <a:t> transcript abundance and read </a:t>
+            </a:r>
+            <a:r>
+              <a:rPr lang="en-US" dirty="0" smtClean="0">
+                <a:latin typeface="Calibri Light"/>
+                <a:cs typeface="Calibri Light"/>
+              </a:rPr>
+              <a:t>assignment</a:t>
+            </a:r>
+          </a:p>
+          <a:p>
+            <a:pPr lvl="1"/>
+            <a:r>
+              <a:rPr lang="en-US" dirty="0">
+                <a:latin typeface="Calibri Light"/>
+                <a:cs typeface="Calibri Light"/>
+              </a:rPr>
+              <a:t>T</a:t>
+            </a:r>
+            <a:r>
+              <a:rPr lang="en-US" dirty="0" smtClean="0">
+                <a:latin typeface="Calibri Light"/>
+                <a:cs typeface="Calibri Light"/>
+              </a:rPr>
+              <a:t>he estimates we find are guaranteed better than some other estimates</a:t>
+            </a:r>
+          </a:p>
+          <a:p>
+            <a:pPr lvl="1"/>
+            <a:r>
+              <a:rPr lang="en-US" dirty="0" smtClean="0">
+                <a:latin typeface="Calibri Light"/>
+                <a:cs typeface="Calibri Light"/>
+              </a:rPr>
+              <a:t>But not guaranteed THE BEST  </a:t>
             </a:r>
             <a:endParaRPr lang="en-US" dirty="0">
               <a:latin typeface="Calibri Light"/>
@@ -3358,8 +4592,8 @@
         </p:blipFill>
         <p:spPr>
           <a:xfrm>
-            <a:off x="2349500" y="3255963"/>
-            <a:ext cx="4445000" cy="2921000"/>
+            <a:off x="3067666" y="4570471"/>
+            <a:ext cx="2649998" cy="1741428"/>
           </a:xfrm>
           <a:prstGeom prst="rect">
             <a:avLst/>
@@ -3379,7 +4613,7 @@
   <p:timing>
     <p:tnLst>
       <p:par>
-        <p:cTn xmlns:p14="http://schemas.microsoft.com/office/powerpoint/2010/main" id="1" dur="indefinite" restart="never" nodeType="tmRoot">
+        <p:cTn id="1" dur="indefinite" restart="never" nodeType="tmRoot">
           <p:childTnLst>
             <p:seq concurrent="1" nextAc="seek">
               <p:cTn id="2" dur="indefinite" nodeType="mainSeq">
@@ -3427,33 +4661,15 @@
                                   </p:childTnLst>
                                 </p:cTn>
                               </p:par>
-                            </p:childTnLst>
-                          </p:cTn>
-                        </p:par>
-                      </p:childTnLst>
-                    </p:cTn>
-                  </p:par>
-                  <p:par>
-                    <p:cTn id="7" fill="hold">
-                      <p:stCondLst>
-                        <p:cond delay="indefinite"/>
-                      </p:stCondLst>
-                      <p:childTnLst>
-                        <p:par>
-                          <p:cTn id="8" fill="hold">
-                            <p:stCondLst>
-                              <p:cond delay="0"/>
-                            </p:stCondLst>
-                            <p:childTnLst>
                               <p:par>
-                                <p:cTn id="9" presetID="1" presetClass="entr" presetSubtype="0" fill="hold" grpId="0" nodeType="clickEffect">
+                                <p:cTn id="7" presetID="1" presetClass="entr" presetSubtype="0" fill="hold" grpId="0" nodeType="withEffect">
                                   <p:stCondLst>
                                     <p:cond delay="0"/>
                                   </p:stCondLst>
                                   <p:childTnLst>
                                     <p:set>
                                       <p:cBhvr>
-                                        <p:cTn id="10" dur="1" fill="hold">
+                                        <p:cTn id="8" dur="1" fill="hold">
                                           <p:stCondLst>
                                             <p:cond delay="0"/>
                                           </p:stCondLst>
@@ -3462,6 +4678,117 @@
                                           <p:spTgt spid="8">
                                             <p:txEl>
                                               <p:pRg st="1" end="1"/>
+                                            </p:txEl>
+                                          </p:spTgt>
+                                        </p:tgtEl>
+                                        <p:attrNameLst>
+                                          <p:attrName>style.visibility</p:attrName>
+                                        </p:attrNameLst>
+                                      </p:cBhvr>
+                                      <p:to>
+                                        <p:strVal val="visible"/>
+                                      </p:to>
+                                    </p:set>
+                                  </p:childTnLst>
+                                </p:cTn>
+                              </p:par>
+                            </p:childTnLst>
+                          </p:cTn>
+                        </p:par>
+                      </p:childTnLst>
+                    </p:cTn>
+                  </p:par>
+                  <p:par>
+                    <p:cTn id="9" fill="hold">
+                      <p:stCondLst>
+                        <p:cond delay="indefinite"/>
+                      </p:stCondLst>
+                      <p:childTnLst>
+                        <p:par>
+                          <p:cTn id="10" fill="hold">
+                            <p:stCondLst>
+                              <p:cond delay="0"/>
+                            </p:stCondLst>
+                            <p:childTnLst>
+                              <p:par>
+                                <p:cTn id="11" presetID="1" presetClass="entr" presetSubtype="0" fill="hold" grpId="0" nodeType="clickEffect">
+                                  <p:stCondLst>
+                                    <p:cond delay="0"/>
+                                  </p:stCondLst>
+                                  <p:childTnLst>
+                                    <p:set>
+                                      <p:cBhvr>
+                                        <p:cTn id="12" dur="1" fill="hold">
+                                          <p:stCondLst>
+                                            <p:cond delay="0"/>
+                                          </p:stCondLst>
+                                        </p:cTn>
+                                        <p:tgtEl>
+                                          <p:spTgt spid="8">
+                                            <p:txEl>
+                                              <p:pRg st="2" end="2"/>
+                                            </p:txEl>
+                                          </p:spTgt>
+                                        </p:tgtEl>
+                                        <p:attrNameLst>
+                                          <p:attrName>style.visibility</p:attrName>
+                                        </p:attrNameLst>
+                                      </p:cBhvr>
+                                      <p:to>
+                                        <p:strVal val="visible"/>
+                                      </p:to>
+                                    </p:set>
+                                  </p:childTnLst>
+                                </p:cTn>
+                              </p:par>
+                              <p:par>
+                                <p:cTn id="13" presetID="1" presetClass="entr" presetSubtype="0" fill="hold" grpId="0" nodeType="withEffect">
+                                  <p:stCondLst>
+                                    <p:cond delay="0"/>
+                                  </p:stCondLst>
+                                  <p:childTnLst>
+                                    <p:set>
+                                      <p:cBhvr>
+                                        <p:cTn id="14" dur="1" fill="hold">
+                                          <p:stCondLst>
+                                            <p:cond delay="0"/>
+                                          </p:stCondLst>
+                                        </p:cTn>
+                                        <p:tgtEl>
+                                          <p:spTgt spid="8">
+                                            <p:txEl>
+                                              <p:pRg st="3" end="3"/>
+                                            </p:txEl>
+                                          </p:spTgt>
+                                        </p:tgtEl>
+                                        <p:attrNameLst>
+                                          <p:attrName>style.visibility</p:attrName>
+                                        </p:attrNameLst>
+                                      </p:cBhvr>
+                                      <p:to>
+                                        <p:strVal val="visible"/>
+                                      </p:to>
+                                    </p:set>
+                                  </p:childTnLst>
+                                </p:cTn>
+                              </p:par>
+                              <p:par>
+                                <p:cTn id="15" presetID="1" presetClass="entr" presetSubtype="0" fill="hold" grpId="0" nodeType="withEffect">
+                                  <p:stCondLst>
+                                    <p:cond delay="0"/>
+                                  </p:stCondLst>
+                                  <p:childTnLst>
+                                    <p:set>
+                                      <p:cBhvr>
+                                        <p:cTn id="16" dur="1" fill="hold">
+                                          <p:stCondLst>
+                                            <p:cond delay="0"/>
+                                          </p:stCondLst>
+                                        </p:cTn>
+                                        <p:tgtEl>
+                                          <p:spTgt spid="8">
+                                            <p:txEl>
+                                              <p:pRg st="4" end="4"/>
                                             </p:txEl>
                                           </p:spTgt>
                                         </p:tgtEl>
@@ -3510,7 +4837,7 @@
 </p:sld>
 </file>
 
-<file path=ppt/slides/slide11.xml><?xml version="1.0" encoding="utf-8"?>
+<file path=ppt/slides/slide13.xml><?xml version="1.0" encoding="utf-8"?>
 <p:sld xmlns:a="http://schemas.openxmlformats.org/drawingml/2006/main" xmlns:r="http://schemas.openxmlformats.org/officeDocument/2006/relationships" xmlns:p="http://schemas.openxmlformats.org/presentationml/2006/main">
   <p:cSld>
     <p:spTree>
@@ -4124,7 +5451,7 @@
   <p:timing>
     <p:tnLst>
       <p:par>
-        <p:cTn xmlns:p14="http://schemas.microsoft.com/office/powerpoint/2010/main" id="1" dur="indefinite" restart="never" nodeType="tmRoot">
+        <p:cTn id="1" dur="indefinite" restart="never" nodeType="tmRoot">
           <p:childTnLst>
             <p:seq concurrent="1" nextAc="seek">
               <p:cTn id="2" dur="indefinite" nodeType="mainSeq">
@@ -4723,7 +6050,7 @@
 </p:sld>
 </file>
 
-<file path=ppt/slides/slide12.xml><?xml version="1.0" encoding="utf-8"?>
+<file path=ppt/slides/slide14.xml><?xml version="1.0" encoding="utf-8"?>
 <p:sld xmlns:a="http://schemas.openxmlformats.org/drawingml/2006/main" xmlns:r="http://schemas.openxmlformats.org/officeDocument/2006/relationships" xmlns:p="http://schemas.openxmlformats.org/presentationml/2006/main">
   <p:cSld>
     <p:spTree>
@@ -4911,7 +6238,7 @@
   <p:timing>
     <p:tnLst>
       <p:par>
-        <p:cTn xmlns:p14="http://schemas.microsoft.com/office/powerpoint/2010/main" id="1" dur="indefinite" restart="never" nodeType="tmRoot">
+        <p:cTn id="1" dur="indefinite" restart="never" nodeType="tmRoot">
           <p:childTnLst>
             <p:seq concurrent="1" nextAc="seek">
               <p:cTn id="2" dur="indefinite" nodeType="mainSeq">
@@ -5228,7 +6555,7 @@
 </p:sld>
 </file>
 
-<file path=ppt/slides/slide13.xml><?xml version="1.0" encoding="utf-8"?>
+<file path=ppt/slides/slide15.xml><?xml version="1.0" encoding="utf-8"?>
 <p:sld xmlns:a="http://schemas.openxmlformats.org/drawingml/2006/main" xmlns:r="http://schemas.openxmlformats.org/officeDocument/2006/relationships" xmlns:p="http://schemas.openxmlformats.org/presentationml/2006/main">
   <p:cSld>
     <p:spTree>
@@ -5369,7 +6696,7 @@
   <p:timing>
     <p:tnLst>
       <p:par>
-        <p:cTn xmlns:p14="http://schemas.microsoft.com/office/powerpoint/2010/main" id="1" dur="indefinite" restart="never" nodeType="tmRoot">
+        <p:cTn id="1" dur="indefinite" restart="never" nodeType="tmRoot">
           <p:childTnLst>
             <p:seq concurrent="1" nextAc="seek">
               <p:cTn id="2" dur="indefinite" nodeType="mainSeq">
@@ -5673,7 +7000,7 @@
 </p:sld>
 </file>
 
-<file path=ppt/slides/slide14.xml><?xml version="1.0" encoding="utf-8"?>
+<file path=ppt/slides/slide16.xml><?xml version="1.0" encoding="utf-8"?>
 <p:sld xmlns:a="http://schemas.openxmlformats.org/drawingml/2006/main" xmlns:r="http://schemas.openxmlformats.org/officeDocument/2006/relationships" xmlns:p="http://schemas.openxmlformats.org/presentationml/2006/main">
   <p:cSld>
     <p:spTree>
@@ -6208,14 +7535,14 @@
   <p:timing>
     <p:tnLst>
       <p:par>
-        <p:cTn xmlns:p14="http://schemas.microsoft.com/office/powerpoint/2010/main" id="1" dur="indefinite" restart="never" nodeType="tmRoot"/>
+        <p:cTn id="1" dur="indefinite" restart="never" nodeType="tmRoot"/>
       </p:par>
     </p:tnLst>
   </p:timing>
 </p:sld>
 </file>
 
-<file path=ppt/slides/slide15.xml><?xml version="1.0" encoding="utf-8"?>
+<file path=ppt/slides/slide17.xml><?xml version="1.0" encoding="utf-8"?>
 <p:sld xmlns:a="http://schemas.openxmlformats.org/drawingml/2006/main" xmlns:r="http://schemas.openxmlformats.org/officeDocument/2006/relationships" xmlns:p="http://schemas.openxmlformats.org/presentationml/2006/main">
   <p:cSld>
     <p:spTree>
@@ -6433,14 +7760,14 @@
   <p:timing>
     <p:tnLst>
       <p:par>
-        <p:cTn xmlns:p14="http://schemas.microsoft.com/office/powerpoint/2010/main" id="1" dur="indefinite" restart="never" nodeType="tmRoot"/>
+        <p:cTn id="1" dur="indefinite" restart="never" nodeType="tmRoot"/>
       </p:par>
     </p:tnLst>
   </p:timing>
 </p:sld>
 </file>
 
-<file path=ppt/slides/slide16.xml><?xml version="1.0" encoding="utf-8"?>
+<file path=ppt/slides/slide18.xml><?xml version="1.0" encoding="utf-8"?>
 <p:sld xmlns:a="http://schemas.openxmlformats.org/drawingml/2006/main" xmlns:r="http://schemas.openxmlformats.org/officeDocument/2006/relationships" xmlns:p="http://schemas.openxmlformats.org/presentationml/2006/main">
   <p:cSld>
     <p:spTree>
@@ -6961,7 +8288,7 @@
   <p:timing>
     <p:tnLst>
       <p:par>
-        <p:cTn xmlns:p14="http://schemas.microsoft.com/office/powerpoint/2010/main" id="1" dur="indefinite" restart="never" nodeType="tmRoot">
+        <p:cTn id="1" dur="indefinite" restart="never" nodeType="tmRoot">
           <p:childTnLst>
             <p:seq concurrent="1" nextAc="seek">
               <p:cTn id="2" dur="indefinite" nodeType="mainSeq">
@@ -7036,6 +8363,163 @@
 </p:sld>
 </file>
 
+<file path=ppt/slides/slide19.xml><?xml version="1.0" encoding="utf-8"?>
+<p:sld xmlns:a="http://schemas.openxmlformats.org/drawingml/2006/main" xmlns:r="http://schemas.openxmlformats.org/officeDocument/2006/relationships" xmlns:p="http://schemas.openxmlformats.org/presentationml/2006/main">
+  <p:cSld>
+    <p:spTree>
+      <p:nvGrpSpPr>
+        <p:cNvPr id="1" name=""/>
+        <p:cNvGrpSpPr/>
+        <p:nvPr/>
+      </p:nvGrpSpPr>
+      <p:grpSpPr>
+        <a:xfrm>
+          <a:off x="0" y="0"/>
+          <a:ext cx="0" cy="0"/>
+          <a:chOff x="0" y="0"/>
+          <a:chExt cx="0" cy="0"/>
+        </a:xfrm>
+      </p:grpSpPr>
+      <p:pic>
+        <p:nvPicPr>
+          <p:cNvPr id="4" name="Picture 3"/>
+          <p:cNvPicPr>
+            <a:picLocks noChangeAspect="1"/>
+          </p:cNvPicPr>
+          <p:nvPr/>
+        </p:nvPicPr>
+        <p:blipFill>
+          <a:blip r:embed="rId2"/>
+          <a:stretch>
+            <a:fillRect/>
+          </a:stretch>
+        </p:blipFill>
+        <p:spPr>
+          <a:xfrm>
+            <a:off x="778796" y="745203"/>
+            <a:ext cx="2172052" cy="731520"/>
+          </a:xfrm>
+          <a:prstGeom prst="rect">
+            <a:avLst/>
+          </a:prstGeom>
+        </p:spPr>
+      </p:pic>
+      <p:pic>
+        <p:nvPicPr>
+          <p:cNvPr id="5" name="Picture 4"/>
+          <p:cNvPicPr>
+            <a:picLocks noChangeAspect="1"/>
+          </p:cNvPicPr>
+          <p:nvPr/>
+        </p:nvPicPr>
+        <p:blipFill>
+          <a:blip r:embed="rId3"/>
+          <a:stretch>
+            <a:fillRect/>
+          </a:stretch>
+        </p:blipFill>
+        <p:spPr>
+          <a:xfrm>
+            <a:off x="778796" y="2752797"/>
+            <a:ext cx="2978331" cy="731520"/>
+          </a:xfrm>
+          <a:prstGeom prst="rect">
+            <a:avLst/>
+          </a:prstGeom>
+        </p:spPr>
+      </p:pic>
+      <p:pic>
+        <p:nvPicPr>
+          <p:cNvPr id="6" name="Picture 5"/>
+          <p:cNvPicPr>
+            <a:picLocks noChangeAspect="1"/>
+          </p:cNvPicPr>
+          <p:nvPr/>
+        </p:nvPicPr>
+        <p:blipFill>
+          <a:blip r:embed="rId4"/>
+          <a:stretch>
+            <a:fillRect/>
+          </a:stretch>
+        </p:blipFill>
+        <p:spPr>
+          <a:xfrm>
+            <a:off x="778796" y="3756594"/>
+            <a:ext cx="3226891" cy="731520"/>
+          </a:xfrm>
+          <a:prstGeom prst="rect">
+            <a:avLst/>
+          </a:prstGeom>
+        </p:spPr>
+      </p:pic>
+      <p:pic>
+        <p:nvPicPr>
+          <p:cNvPr id="7" name="Picture 6"/>
+          <p:cNvPicPr>
+            <a:picLocks noChangeAspect="1"/>
+          </p:cNvPicPr>
+          <p:nvPr/>
+        </p:nvPicPr>
+        <p:blipFill>
+          <a:blip r:embed="rId5"/>
+          <a:stretch>
+            <a:fillRect/>
+          </a:stretch>
+        </p:blipFill>
+        <p:spPr>
+          <a:xfrm>
+            <a:off x="778796" y="4760393"/>
+            <a:ext cx="2470380" cy="731520"/>
+          </a:xfrm>
+          <a:prstGeom prst="rect">
+            <a:avLst/>
+          </a:prstGeom>
+        </p:spPr>
+      </p:pic>
+      <p:pic>
+        <p:nvPicPr>
+          <p:cNvPr id="8" name="Picture 7"/>
+          <p:cNvPicPr>
+            <a:picLocks noChangeAspect="1"/>
+          </p:cNvPicPr>
+          <p:nvPr/>
+        </p:nvPicPr>
+        <p:blipFill>
+          <a:blip r:embed="rId6"/>
+          <a:stretch>
+            <a:fillRect/>
+          </a:stretch>
+        </p:blipFill>
+        <p:spPr>
+          <a:xfrm>
+            <a:off x="778796" y="1749000"/>
+            <a:ext cx="4733365" cy="731520"/>
+          </a:xfrm>
+          <a:prstGeom prst="rect">
+            <a:avLst/>
+          </a:prstGeom>
+        </p:spPr>
+      </p:pic>
+    </p:spTree>
+    <p:extLst>
+      <p:ext uri="{BB962C8B-B14F-4D97-AF65-F5344CB8AC3E}">
+        <p14:creationId xmlns:p14="http://schemas.microsoft.com/office/powerpoint/2010/main" val="857731139"/>
+      </p:ext>
+    </p:extLst>
+  </p:cSld>
+  <p:clrMapOvr>
+    <a:masterClrMapping/>
+  </p:clrMapOvr>
+  <p:timing>
+    <p:tnLst>
+      <p:par>
+        <p:cTn id="1" dur="indefinite" restart="never" nodeType="tmRoot"/>
+      </p:par>
+    </p:tnLst>
+  </p:timing>
+</p:sld>
+</file>
+
 <file path=ppt/slides/slide2.xml><?xml version="1.0" encoding="utf-8"?>
 <p:sld xmlns:a="http://schemas.openxmlformats.org/drawingml/2006/main" xmlns:r="http://schemas.openxmlformats.org/officeDocument/2006/relationships" xmlns:p="http://schemas.openxmlformats.org/presentationml/2006/main">
   <p:cSld>
@@ -7068,10 +8552,9 @@
           <a:bodyPr/>
           <a:lstStyle/>
           <a:p>
-            <a:pPr algn="l"/>
             <a:r>
               <a:rPr lang="en-US" dirty="0" smtClean="0"/>
-              <a:t>Common workflow</a:t>
+              <a:t>Outline</a:t>
             </a:r>
             <a:endParaRPr lang="en-US" dirty="0"/>
           </a:p>
@@ -7094,55 +8577,175 @@
           <a:p>
             <a:r>
               <a:rPr lang="en-US" dirty="0" smtClean="0">
-                <a:latin typeface="Calibri Light"/>
-                <a:cs typeface="Calibri Light"/>
-              </a:rPr>
-              <a:t>Assign reads to annotated transcripts</a:t>
-            </a:r>
-          </a:p>
-          <a:p>
+                <a:latin typeface="Calibri Light" charset="0"/>
+                <a:ea typeface="Calibri Light" charset="0"/>
+                <a:cs typeface="Calibri Light" charset="0"/>
+              </a:rPr>
+              <a:t>Mapping</a:t>
+            </a:r>
+          </a:p>
+          <a:p>
+            <a:pPr lvl="1"/>
             <a:r>
               <a:rPr lang="en-US" dirty="0" smtClean="0">
-                <a:latin typeface="Calibri Light"/>
-                <a:cs typeface="Calibri Light"/>
-              </a:rPr>
-              <a:t>Quantify transcript abundance</a:t>
-            </a:r>
-          </a:p>
-          <a:p>
+                <a:latin typeface="Calibri Light" charset="0"/>
+                <a:ea typeface="Calibri Light" charset="0"/>
+                <a:cs typeface="Calibri Light" charset="0"/>
+              </a:rPr>
+              <a:t>me talking</a:t>
+            </a:r>
+          </a:p>
+          <a:p>
+            <a:pPr lvl="1"/>
             <a:r>
               <a:rPr lang="en-US" dirty="0" smtClean="0">
-                <a:latin typeface="Calibri Light"/>
-                <a:cs typeface="Calibri Light"/>
-              </a:rPr>
-              <a:t>Differential expression (DE) analysis</a:t>
-            </a:r>
-          </a:p>
-          <a:p>
-            <a:r>
-              <a:rPr lang="mr-IN" dirty="0" smtClean="0">
-                <a:latin typeface="Calibri Light"/>
-                <a:cs typeface="Calibri Light"/>
-              </a:rPr>
-              <a:t>…</a:t>
+                <a:latin typeface="Calibri Light" charset="0"/>
+                <a:ea typeface="Calibri Light" charset="0"/>
+                <a:cs typeface="Calibri Light" charset="0"/>
+              </a:rPr>
+              <a:t>EM algorithm to assign ambiguously mapped reads to transcripts</a:t>
+            </a:r>
+          </a:p>
+          <a:p>
+            <a:r>
+              <a:rPr lang="en-US" dirty="0" smtClean="0">
+                <a:latin typeface="Calibri Light" charset="0"/>
+                <a:ea typeface="Calibri Light" charset="0"/>
+                <a:cs typeface="Calibri Light" charset="0"/>
+              </a:rPr>
+              <a:t>Differential expression analysis</a:t>
+            </a:r>
+          </a:p>
+          <a:p>
+            <a:pPr lvl="1"/>
+            <a:r>
+              <a:rPr lang="en-US" dirty="0" smtClean="0">
+                <a:latin typeface="Calibri Light" charset="0"/>
+                <a:ea typeface="Calibri Light" charset="0"/>
+                <a:cs typeface="Calibri Light" charset="0"/>
+              </a:rPr>
+              <a:t>me talking</a:t>
+            </a:r>
+          </a:p>
+          <a:p>
+            <a:pPr lvl="1"/>
+            <a:r>
+              <a:rPr lang="en-US" dirty="0" smtClean="0">
+                <a:latin typeface="Calibri Light" charset="0"/>
+                <a:ea typeface="Calibri Light" charset="0"/>
+                <a:cs typeface="Calibri Light" charset="0"/>
+              </a:rPr>
+              <a:t>demo</a:t>
+            </a:r>
+          </a:p>
+          <a:p>
+            <a:r>
+              <a:rPr lang="en-US" dirty="0" err="1" smtClean="0">
+                <a:latin typeface="Calibri Light" charset="0"/>
+                <a:ea typeface="Calibri Light" charset="0"/>
+                <a:cs typeface="Calibri Light" charset="0"/>
+              </a:rPr>
+              <a:t>Misc</a:t>
             </a:r>
             <a:endParaRPr lang="en-US" dirty="0" smtClean="0">
-              <a:latin typeface="Calibri Light"/>
-              <a:cs typeface="Calibri Light"/>
+              <a:latin typeface="Calibri Light" charset="0"/>
+              <a:ea typeface="Calibri Light" charset="0"/>
+              <a:cs typeface="Calibri Light" charset="0"/>
             </a:endParaRPr>
           </a:p>
           <a:p>
+            <a:pPr lvl="1"/>
+            <a:r>
+              <a:rPr lang="en-US" dirty="0" smtClean="0">
+                <a:latin typeface="Calibri Light" charset="0"/>
+                <a:ea typeface="Calibri Light" charset="0"/>
+                <a:cs typeface="Calibri Light" charset="0"/>
+              </a:rPr>
+              <a:t>workflow organization</a:t>
+            </a:r>
+          </a:p>
+          <a:p>
+            <a:pPr lvl="1"/>
+            <a:r>
+              <a:rPr lang="en-US" dirty="0" smtClean="0">
+                <a:latin typeface="Calibri Light" charset="0"/>
+                <a:ea typeface="Calibri Light" charset="0"/>
+                <a:cs typeface="Calibri Light" charset="0"/>
+              </a:rPr>
+              <a:t>reproducible analysis</a:t>
+            </a:r>
+          </a:p>
+          <a:p>
+            <a:pPr lvl="1"/>
+            <a:r>
+              <a:rPr lang="en-US" dirty="0" smtClean="0">
+                <a:latin typeface="Calibri Light" charset="0"/>
+                <a:ea typeface="Calibri Light" charset="0"/>
+                <a:cs typeface="Calibri Light" charset="0"/>
+              </a:rPr>
+              <a:t>resources</a:t>
+            </a:r>
             <a:endParaRPr lang="en-US" dirty="0">
-              <a:latin typeface="Calibri Light"/>
-              <a:cs typeface="Calibri Light"/>
+              <a:latin typeface="Calibri Light" charset="0"/>
+              <a:ea typeface="Calibri Light" charset="0"/>
+              <a:cs typeface="Calibri Light" charset="0"/>
             </a:endParaRPr>
+          </a:p>
+        </p:txBody>
+      </p:sp>
+      <p:sp>
+        <p:nvSpPr>
+          <p:cNvPr id="4" name="Rectangle 3"/>
+          <p:cNvSpPr/>
+          <p:nvPr/>
+        </p:nvSpPr>
+        <p:spPr>
+          <a:xfrm>
+            <a:off x="2061407" y="5529335"/>
+            <a:ext cx="4791120" cy="369332"/>
+          </a:xfrm>
+          <a:prstGeom prst="rect">
+            <a:avLst/>
+          </a:prstGeom>
+        </p:spPr>
+        <p:txBody>
+          <a:bodyPr wrap="none">
+            <a:spAutoFit/>
+          </a:bodyPr>
+          <a:lstStyle/>
+          <a:p>
+            <a:r>
+              <a:rPr lang="en-US" smtClean="0"/>
+              <a:t>Click here! </a:t>
+            </a:r>
+            <a:r>
+              <a:rPr lang="en-US" dirty="0" smtClean="0"/>
+              <a:t>https</a:t>
+            </a:r>
+            <a:r>
+              <a:rPr lang="en-US" dirty="0"/>
+              <a:t>://</a:t>
+            </a:r>
+            <a:r>
+              <a:rPr lang="en-US" dirty="0" err="1"/>
+              <a:t>github.com</a:t>
+            </a:r>
+            <a:r>
+              <a:rPr lang="en-US" dirty="0"/>
+              <a:t>/Yue-Jiang/</a:t>
+            </a:r>
+            <a:r>
+              <a:rPr lang="en-US" dirty="0" err="1"/>
+              <a:t>achems</a:t>
+            </a:r>
+            <a:endParaRPr lang="en-US" dirty="0"/>
           </a:p>
         </p:txBody>
       </p:sp>
     </p:spTree>
     <p:extLst>
       <p:ext uri="{BB962C8B-B14F-4D97-AF65-F5344CB8AC3E}">
-        <p14:creationId xmlns:p14="http://schemas.microsoft.com/office/powerpoint/2010/main" val="37819426"/>
+        <p14:creationId xmlns:p14="http://schemas.microsoft.com/office/powerpoint/2010/main" val="474811616"/>
       </p:ext>
     </p:extLst>
   </p:cSld>
@@ -7152,9 +8755,445 @@
   <p:timing>
     <p:tnLst>
       <p:par>
-        <p:cTn xmlns:p14="http://schemas.microsoft.com/office/powerpoint/2010/main" id="1" dur="indefinite" restart="never" nodeType="tmRoot"/>
+        <p:cTn id="1" dur="indefinite" restart="never" nodeType="tmRoot">
+          <p:childTnLst>
+            <p:seq concurrent="1" nextAc="seek">
+              <p:cTn id="2" dur="indefinite" nodeType="mainSeq">
+                <p:childTnLst>
+                  <p:par>
+                    <p:cTn id="3" fill="hold">
+                      <p:stCondLst>
+                        <p:cond delay="indefinite"/>
+                      </p:stCondLst>
+                      <p:childTnLst>
+                        <p:par>
+                          <p:cTn id="4" fill="hold">
+                            <p:stCondLst>
+                              <p:cond delay="0"/>
+                            </p:stCondLst>
+                            <p:childTnLst>
+                              <p:par>
+                                <p:cTn id="5" presetID="1" presetClass="entr" presetSubtype="0" fill="hold" grpId="0" nodeType="clickEffect">
+                                  <p:stCondLst>
+                                    <p:cond delay="0"/>
+                                  </p:stCondLst>
+                                  <p:childTnLst>
+                                    <p:set>
+                                      <p:cBhvr>
+                                        <p:cTn id="6" dur="1" fill="hold">
+                                          <p:stCondLst>
+                                            <p:cond delay="0"/>
+                                          </p:stCondLst>
+                                        </p:cTn>
+                                        <p:tgtEl>
+                                          <p:spTgt spid="3">
+                                            <p:txEl>
+                                              <p:pRg st="0" end="0"/>
+                                            </p:txEl>
+                                          </p:spTgt>
+                                        </p:tgtEl>
+                                        <p:attrNameLst>
+                                          <p:attrName>style.visibility</p:attrName>
+                                        </p:attrNameLst>
+                                      </p:cBhvr>
+                                      <p:to>
+                                        <p:strVal val="visible"/>
+                                      </p:to>
+                                    </p:set>
+                                  </p:childTnLst>
+                                </p:cTn>
+                              </p:par>
+                              <p:par>
+                                <p:cTn id="7" presetID="1" presetClass="entr" presetSubtype="0" fill="hold" grpId="0" nodeType="withEffect">
+                                  <p:stCondLst>
+                                    <p:cond delay="0"/>
+                                  </p:stCondLst>
+                                  <p:childTnLst>
+                                    <p:set>
+                                      <p:cBhvr>
+                                        <p:cTn id="8" dur="1" fill="hold">
+                                          <p:stCondLst>
+                                            <p:cond delay="0"/>
+                                          </p:stCondLst>
+                                        </p:cTn>
+                                        <p:tgtEl>
+                                          <p:spTgt spid="3">
+                                            <p:txEl>
+                                              <p:pRg st="1" end="1"/>
+                                            </p:txEl>
+                                          </p:spTgt>
+                                        </p:tgtEl>
+                                        <p:attrNameLst>
+                                          <p:attrName>style.visibility</p:attrName>
+                                        </p:attrNameLst>
+                                      </p:cBhvr>
+                                      <p:to>
+                                        <p:strVal val="visible"/>
+                                      </p:to>
+                                    </p:set>
+                                  </p:childTnLst>
+                                </p:cTn>
+                              </p:par>
+                              <p:par>
+                                <p:cTn id="9" presetID="1" presetClass="entr" presetSubtype="0" fill="hold" grpId="0" nodeType="withEffect">
+                                  <p:stCondLst>
+                                    <p:cond delay="0"/>
+                                  </p:stCondLst>
+                                  <p:childTnLst>
+                                    <p:set>
+                                      <p:cBhvr>
+                                        <p:cTn id="10" dur="1" fill="hold">
+                                          <p:stCondLst>
+                                            <p:cond delay="0"/>
+                                          </p:stCondLst>
+                                        </p:cTn>
+                                        <p:tgtEl>
+                                          <p:spTgt spid="3">
+                                            <p:txEl>
+                                              <p:pRg st="2" end="2"/>
+                                            </p:txEl>
+                                          </p:spTgt>
+                                        </p:tgtEl>
+                                        <p:attrNameLst>
+                                          <p:attrName>style.visibility</p:attrName>
+                                        </p:attrNameLst>
+                                      </p:cBhvr>
+                                      <p:to>
+                                        <p:strVal val="visible"/>
+                                      </p:to>
+                                    </p:set>
+                                  </p:childTnLst>
+                                </p:cTn>
+                              </p:par>
+                            </p:childTnLst>
+                          </p:cTn>
+                        </p:par>
+                      </p:childTnLst>
+                    </p:cTn>
+                  </p:par>
+                  <p:par>
+                    <p:cTn id="11" fill="hold">
+                      <p:stCondLst>
+                        <p:cond delay="indefinite"/>
+                      </p:stCondLst>
+                      <p:childTnLst>
+                        <p:par>
+                          <p:cTn id="12" fill="hold">
+                            <p:stCondLst>
+                              <p:cond delay="0"/>
+                            </p:stCondLst>
+                            <p:childTnLst>
+                              <p:par>
+                                <p:cTn id="13" presetID="1" presetClass="entr" presetSubtype="0" fill="hold" grpId="0" nodeType="clickEffect">
+                                  <p:stCondLst>
+                                    <p:cond delay="0"/>
+                                  </p:stCondLst>
+                                  <p:childTnLst>
+                                    <p:set>
+                                      <p:cBhvr>
+                                        <p:cTn id="14" dur="1" fill="hold">
+                                          <p:stCondLst>
+                                            <p:cond delay="0"/>
+                                          </p:stCondLst>
+                                        </p:cTn>
+                                        <p:tgtEl>
+                                          <p:spTgt spid="3">
+                                            <p:txEl>
+                                              <p:pRg st="3" end="3"/>
+                                            </p:txEl>
+                                          </p:spTgt>
+                                        </p:tgtEl>
+                                        <p:attrNameLst>
+                                          <p:attrName>style.visibility</p:attrName>
+                                        </p:attrNameLst>
+                                      </p:cBhvr>
+                                      <p:to>
+                                        <p:strVal val="visible"/>
+                                      </p:to>
+                                    </p:set>
+                                  </p:childTnLst>
+                                </p:cTn>
+                              </p:par>
+                              <p:par>
+                                <p:cTn id="15" presetID="1" presetClass="entr" presetSubtype="0" fill="hold" grpId="0" nodeType="withEffect">
+                                  <p:stCondLst>
+                                    <p:cond delay="0"/>
+                                  </p:stCondLst>
+                                  <p:childTnLst>
+                                    <p:set>
+                                      <p:cBhvr>
+                                        <p:cTn id="16" dur="1" fill="hold">
+                                          <p:stCondLst>
+                                            <p:cond delay="0"/>
+                                          </p:stCondLst>
+                                        </p:cTn>
+                                        <p:tgtEl>
+                                          <p:spTgt spid="3">
+                                            <p:txEl>
+                                              <p:pRg st="4" end="4"/>
+                                            </p:txEl>
+                                          </p:spTgt>
+                                        </p:tgtEl>
+                                        <p:attrNameLst>
+                                          <p:attrName>style.visibility</p:attrName>
+                                        </p:attrNameLst>
+                                      </p:cBhvr>
+                                      <p:to>
+                                        <p:strVal val="visible"/>
+                                      </p:to>
+                                    </p:set>
+                                  </p:childTnLst>
+                                </p:cTn>
+                              </p:par>
+                              <p:par>
+                                <p:cTn id="17" presetID="1" presetClass="entr" presetSubtype="0" fill="hold" grpId="0" nodeType="withEffect">
+                                  <p:stCondLst>
+                                    <p:cond delay="0"/>
+                                  </p:stCondLst>
+                                  <p:childTnLst>
+                                    <p:set>
+                                      <p:cBhvr>
+                                        <p:cTn id="18" dur="1" fill="hold">
+                                          <p:stCondLst>
+                                            <p:cond delay="0"/>
+                                          </p:stCondLst>
+                                        </p:cTn>
+                                        <p:tgtEl>
+                                          <p:spTgt spid="3">
+                                            <p:txEl>
+                                              <p:pRg st="5" end="5"/>
+                                            </p:txEl>
+                                          </p:spTgt>
+                                        </p:tgtEl>
+                                        <p:attrNameLst>
+                                          <p:attrName>style.visibility</p:attrName>
+                                        </p:attrNameLst>
+                                      </p:cBhvr>
+                                      <p:to>
+                                        <p:strVal val="visible"/>
+                                      </p:to>
+                                    </p:set>
+                                  </p:childTnLst>
+                                </p:cTn>
+                              </p:par>
+                            </p:childTnLst>
+                          </p:cTn>
+                        </p:par>
+                      </p:childTnLst>
+                    </p:cTn>
+                  </p:par>
+                  <p:par>
+                    <p:cTn id="19" fill="hold">
+                      <p:stCondLst>
+                        <p:cond delay="indefinite"/>
+                      </p:stCondLst>
+                      <p:childTnLst>
+                        <p:par>
+                          <p:cTn id="20" fill="hold">
+                            <p:stCondLst>
+                              <p:cond delay="0"/>
+                            </p:stCondLst>
+                            <p:childTnLst>
+                              <p:par>
+                                <p:cTn id="21" presetID="1" presetClass="entr" presetSubtype="0" fill="hold" grpId="0" nodeType="clickEffect">
+                                  <p:stCondLst>
+                                    <p:cond delay="0"/>
+                                  </p:stCondLst>
+                                  <p:childTnLst>
+                                    <p:set>
+                                      <p:cBhvr>
+                                        <p:cTn id="22" dur="1" fill="hold">
+                                          <p:stCondLst>
+                                            <p:cond delay="0"/>
+                                          </p:stCondLst>
+                                        </p:cTn>
+                                        <p:tgtEl>
+                                          <p:spTgt spid="3">
+                                            <p:txEl>
+                                              <p:pRg st="6" end="6"/>
+                                            </p:txEl>
+                                          </p:spTgt>
+                                        </p:tgtEl>
+                                        <p:attrNameLst>
+                                          <p:attrName>style.visibility</p:attrName>
+                                        </p:attrNameLst>
+                                      </p:cBhvr>
+                                      <p:to>
+                                        <p:strVal val="visible"/>
+                                      </p:to>
+                                    </p:set>
+                                  </p:childTnLst>
+                                </p:cTn>
+                              </p:par>
+                              <p:par>
+                                <p:cTn id="23" presetID="1" presetClass="entr" presetSubtype="0" fill="hold" grpId="0" nodeType="withEffect">
+                                  <p:stCondLst>
+                                    <p:cond delay="0"/>
+                                  </p:stCondLst>
+                                  <p:childTnLst>
+                                    <p:set>
+                                      <p:cBhvr>
+                                        <p:cTn id="24" dur="1" fill="hold">
+                                          <p:stCondLst>
+                                            <p:cond delay="0"/>
+                                          </p:stCondLst>
+                                        </p:cTn>
+                                        <p:tgtEl>
+                                          <p:spTgt spid="3">
+                                            <p:txEl>
+                                              <p:pRg st="7" end="7"/>
+                                            </p:txEl>
+                                          </p:spTgt>
+                                        </p:tgtEl>
+                                        <p:attrNameLst>
+                                          <p:attrName>style.visibility</p:attrName>
+                                        </p:attrNameLst>
+                                      </p:cBhvr>
+                                      <p:to>
+                                        <p:strVal val="visible"/>
+                                      </p:to>
+                                    </p:set>
+                                  </p:childTnLst>
+                                </p:cTn>
+                              </p:par>
+                              <p:par>
+                                <p:cTn id="25" presetID="1" presetClass="entr" presetSubtype="0" fill="hold" grpId="0" nodeType="withEffect">
+                                  <p:stCondLst>
+                                    <p:cond delay="0"/>
+                                  </p:stCondLst>
+                                  <p:childTnLst>
+                                    <p:set>
+                                      <p:cBhvr>
+                                        <p:cTn id="26" dur="1" fill="hold">
+                                          <p:stCondLst>
+                                            <p:cond delay="0"/>
+                                          </p:stCondLst>
+                                        </p:cTn>
+                                        <p:tgtEl>
+                                          <p:spTgt spid="3">
+                                            <p:txEl>
+                                              <p:pRg st="8" end="8"/>
+                                            </p:txEl>
+                                          </p:spTgt>
+                                        </p:tgtEl>
+                                        <p:attrNameLst>
+                                          <p:attrName>style.visibility</p:attrName>
+                                        </p:attrNameLst>
+                                      </p:cBhvr>
+                                      <p:to>
+                                        <p:strVal val="visible"/>
+                                      </p:to>
+                                    </p:set>
+                                  </p:childTnLst>
+                                </p:cTn>
+                              </p:par>
+                              <p:par>
+                                <p:cTn id="27" presetID="1" presetClass="entr" presetSubtype="0" fill="hold" grpId="0" nodeType="withEffect">
+                                  <p:stCondLst>
+                                    <p:cond delay="0"/>
+                                  </p:stCondLst>
+                                  <p:childTnLst>
+                                    <p:set>
+                                      <p:cBhvr>
+                                        <p:cTn id="28" dur="1" fill="hold">
+                                          <p:stCondLst>
+                                            <p:cond delay="0"/>
+                                          </p:stCondLst>
+                                        </p:cTn>
+                                        <p:tgtEl>
+                                          <p:spTgt spid="3">
+                                            <p:txEl>
+                                              <p:pRg st="9" end="9"/>
+                                            </p:txEl>
+                                          </p:spTgt>
+                                        </p:tgtEl>
+                                        <p:attrNameLst>
+                                          <p:attrName>style.visibility</p:attrName>
+                                        </p:attrNameLst>
+                                      </p:cBhvr>
+                                      <p:to>
+                                        <p:strVal val="visible"/>
+                                      </p:to>
+                                    </p:set>
+                                  </p:childTnLst>
+                                </p:cTn>
+                              </p:par>
+                            </p:childTnLst>
+                          </p:cTn>
+                        </p:par>
+                      </p:childTnLst>
+                    </p:cTn>
+                  </p:par>
+                  <p:par>
+                    <p:cTn id="29" fill="hold">
+                      <p:stCondLst>
+                        <p:cond delay="indefinite"/>
+                      </p:stCondLst>
+                      <p:childTnLst>
+                        <p:par>
+                          <p:cTn id="30" fill="hold">
+                            <p:stCondLst>
+                              <p:cond delay="0"/>
+                            </p:stCondLst>
+                            <p:childTnLst>
+                              <p:par>
+                                <p:cTn id="31" presetID="1" presetClass="entr" presetSubtype="0" fill="hold" grpId="0" nodeType="clickEffect">
+                                  <p:stCondLst>
+                                    <p:cond delay="0"/>
+                                  </p:stCondLst>
+                                  <p:childTnLst>
+                                    <p:set>
+                                      <p:cBhvr>
+                                        <p:cTn id="32" dur="1" fill="hold">
+                                          <p:stCondLst>
+                                            <p:cond delay="0"/>
+                                          </p:stCondLst>
+                                        </p:cTn>
+                                        <p:tgtEl>
+                                          <p:spTgt spid="4"/>
+                                        </p:tgtEl>
+                                        <p:attrNameLst>
+                                          <p:attrName>style.visibility</p:attrName>
+                                        </p:attrNameLst>
+                                      </p:cBhvr>
+                                      <p:to>
+                                        <p:strVal val="visible"/>
+                                      </p:to>
+                                    </p:set>
+                                  </p:childTnLst>
+                                </p:cTn>
+                              </p:par>
+                            </p:childTnLst>
+                          </p:cTn>
+                        </p:par>
+                      </p:childTnLst>
+                    </p:cTn>
+                  </p:par>
+                </p:childTnLst>
+              </p:cTn>
+              <p:prevCondLst>
+                <p:cond evt="onPrev" delay="0">
+                  <p:tgtEl>
+                    <p:sldTgt/>
+                  </p:tgtEl>
+                </p:cond>
+              </p:prevCondLst>
+              <p:nextCondLst>
+                <p:cond evt="onNext" delay="0">
+                  <p:tgtEl>
+                    <p:sldTgt/>
+                  </p:tgtEl>
+                </p:cond>
+              </p:nextCondLst>
+            </p:seq>
+          </p:childTnLst>
+        </p:cTn>
       </p:par>
     </p:tnLst>
+    <p:bldLst>
+      <p:bldP spid="3" grpId="0" build="p"/>
+      <p:bldP spid="4" grpId="0"/>
+    </p:bldLst>
   </p:timing>
 </p:sld>
 </file>
@@ -7194,6 +9233,133 @@
             <a:pPr algn="l"/>
             <a:r>
               <a:rPr lang="en-US" dirty="0" smtClean="0"/>
+              <a:t>Common </a:t>
+            </a:r>
+            <a:r>
+              <a:rPr lang="en-US" dirty="0" smtClean="0"/>
+              <a:t>workflow</a:t>
+            </a:r>
+            <a:endParaRPr lang="en-US" dirty="0"/>
+          </a:p>
+        </p:txBody>
+      </p:sp>
+      <p:sp>
+        <p:nvSpPr>
+          <p:cNvPr id="3" name="Content Placeholder 2"/>
+          <p:cNvSpPr>
+            <a:spLocks noGrp="1"/>
+          </p:cNvSpPr>
+          <p:nvPr>
+            <p:ph idx="1"/>
+          </p:nvPr>
+        </p:nvSpPr>
+        <p:spPr/>
+        <p:txBody>
+          <a:bodyPr/>
+          <a:lstStyle/>
+          <a:p>
+            <a:r>
+              <a:rPr lang="en-US" dirty="0" smtClean="0">
+                <a:latin typeface="Calibri Light"/>
+                <a:cs typeface="Calibri Light"/>
+              </a:rPr>
+              <a:t>Assign reads to annotated transcripts</a:t>
+            </a:r>
+          </a:p>
+          <a:p>
+            <a:r>
+              <a:rPr lang="en-US" dirty="0" smtClean="0">
+                <a:latin typeface="Calibri Light"/>
+                <a:cs typeface="Calibri Light"/>
+              </a:rPr>
+              <a:t>Quantify transcript abundance</a:t>
+            </a:r>
+          </a:p>
+          <a:p>
+            <a:r>
+              <a:rPr lang="en-US" dirty="0" smtClean="0">
+                <a:latin typeface="Calibri Light"/>
+                <a:cs typeface="Calibri Light"/>
+              </a:rPr>
+              <a:t>Differential expression (DE) analysis</a:t>
+            </a:r>
+          </a:p>
+          <a:p>
+            <a:r>
+              <a:rPr lang="mr-IN" dirty="0" smtClean="0">
+                <a:latin typeface="Calibri Light"/>
+                <a:cs typeface="Calibri Light"/>
+              </a:rPr>
+              <a:t>…</a:t>
+            </a:r>
+            <a:endParaRPr lang="en-US" dirty="0" smtClean="0">
+              <a:latin typeface="Calibri Light"/>
+              <a:cs typeface="Calibri Light"/>
+            </a:endParaRPr>
+          </a:p>
+          <a:p>
+            <a:endParaRPr lang="en-US" dirty="0">
+              <a:latin typeface="Calibri Light"/>
+              <a:cs typeface="Calibri Light"/>
+            </a:endParaRPr>
+          </a:p>
+        </p:txBody>
+      </p:sp>
+    </p:spTree>
+    <p:extLst>
+      <p:ext uri="{BB962C8B-B14F-4D97-AF65-F5344CB8AC3E}">
+        <p14:creationId xmlns:p14="http://schemas.microsoft.com/office/powerpoint/2010/main" val="37819426"/>
+      </p:ext>
+    </p:extLst>
+  </p:cSld>
+  <p:clrMapOvr>
+    <a:masterClrMapping/>
+  </p:clrMapOvr>
+  <p:timing>
+    <p:tnLst>
+      <p:par>
+        <p:cTn id="1" dur="indefinite" restart="never" nodeType="tmRoot"/>
+      </p:par>
+    </p:tnLst>
+  </p:timing>
+</p:sld>
+</file>
+
+<file path=ppt/slides/slide4.xml><?xml version="1.0" encoding="utf-8"?>
+<p:sld xmlns:a="http://schemas.openxmlformats.org/drawingml/2006/main" xmlns:r="http://schemas.openxmlformats.org/officeDocument/2006/relationships" xmlns:p="http://schemas.openxmlformats.org/presentationml/2006/main">
+  <p:cSld>
+    <p:spTree>
+      <p:nvGrpSpPr>
+        <p:cNvPr id="1" name=""/>
+        <p:cNvGrpSpPr/>
+        <p:nvPr/>
+      </p:nvGrpSpPr>
+      <p:grpSpPr>
+        <a:xfrm>
+          <a:off x="0" y="0"/>
+          <a:ext cx="0" cy="0"/>
+          <a:chOff x="0" y="0"/>
+          <a:chExt cx="0" cy="0"/>
+        </a:xfrm>
+      </p:grpSpPr>
+      <p:sp>
+        <p:nvSpPr>
+          <p:cNvPr id="2" name="Title 1"/>
+          <p:cNvSpPr>
+            <a:spLocks noGrp="1"/>
+          </p:cNvSpPr>
+          <p:nvPr>
+            <p:ph type="title"/>
+          </p:nvPr>
+        </p:nvSpPr>
+        <p:spPr/>
+        <p:txBody>
+          <a:bodyPr/>
+          <a:lstStyle/>
+          <a:p>
+            <a:pPr algn="l"/>
+            <a:r>
+              <a:rPr lang="en-US" dirty="0" smtClean="0"/>
               <a:t>Assign reads to transcripts / genes</a:t>
             </a:r>
             <a:endParaRPr lang="en-US" dirty="0"/>
@@ -7362,7 +9528,7 @@
   <p:timing>
     <p:tnLst>
       <p:par>
-        <p:cTn xmlns:p14="http://schemas.microsoft.com/office/powerpoint/2010/main" id="1" dur="indefinite" restart="never" nodeType="tmRoot">
+        <p:cTn id="1" dur="indefinite" restart="never" nodeType="tmRoot">
           <p:childTnLst>
             <p:seq concurrent="1" nextAc="seek">
               <p:cTn id="2" dur="indefinite" nodeType="mainSeq">
@@ -7772,7 +9938,7 @@
 </p:sld>
 </file>
 
-<file path=ppt/slides/slide4.xml><?xml version="1.0" encoding="utf-8"?>
+<file path=ppt/slides/slide5.xml><?xml version="1.0" encoding="utf-8"?>
 <p:sld xmlns:a="http://schemas.openxmlformats.org/drawingml/2006/main" xmlns:r="http://schemas.openxmlformats.org/officeDocument/2006/relationships" xmlns:p="http://schemas.openxmlformats.org/presentationml/2006/main">
   <p:cSld>
     <p:spTree>
@@ -7896,7 +10062,7 @@
   <p:timing>
     <p:tnLst>
       <p:par>
-        <p:cTn xmlns:p14="http://schemas.microsoft.com/office/powerpoint/2010/main" id="1" dur="indefinite" restart="never" nodeType="tmRoot">
+        <p:cTn id="1" dur="indefinite" restart="never" nodeType="tmRoot">
           <p:childTnLst>
             <p:seq concurrent="1" nextAc="seek">
               <p:cTn id="2" dur="indefinite" nodeType="mainSeq">
@@ -8125,7 +10291,7 @@
 </p:sld>
 </file>
 
-<file path=ppt/slides/slide5.xml><?xml version="1.0" encoding="utf-8"?>
+<file path=ppt/slides/slide6.xml><?xml version="1.0" encoding="utf-8"?>
 <p:sld xmlns:a="http://schemas.openxmlformats.org/drawingml/2006/main" xmlns:r="http://schemas.openxmlformats.org/officeDocument/2006/relationships" xmlns:p="http://schemas.openxmlformats.org/presentationml/2006/main">
   <p:cSld>
     <p:spTree>
@@ -8332,7 +10498,7 @@
   <p:timing>
     <p:tnLst>
       <p:par>
-        <p:cTn xmlns:p14="http://schemas.microsoft.com/office/powerpoint/2010/main" id="1" dur="indefinite" restart="never" nodeType="tmRoot">
+        <p:cTn id="1" dur="indefinite" restart="never" nodeType="tmRoot">
           <p:childTnLst>
             <p:seq concurrent="1" nextAc="seek">
               <p:cTn id="2" dur="indefinite" nodeType="mainSeq">
@@ -8680,7 +10846,7 @@
 </p:sld>
 </file>
 
-<file path=ppt/slides/slide6.xml><?xml version="1.0" encoding="utf-8"?>
+<file path=ppt/slides/slide7.xml><?xml version="1.0" encoding="utf-8"?>
 <p:sld xmlns:a="http://schemas.openxmlformats.org/drawingml/2006/main" xmlns:r="http://schemas.openxmlformats.org/officeDocument/2006/relationships" xmlns:p="http://schemas.openxmlformats.org/presentationml/2006/main">
   <p:cSld>
     <p:spTree>
@@ -8697,30 +10863,6 @@
           <a:chExt cx="0" cy="0"/>
         </a:xfrm>
       </p:grpSpPr>
-      <p:pic>
-        <p:nvPicPr>
-          <p:cNvPr id="4" name="Picture 3"/>
-          <p:cNvPicPr>
-            <a:picLocks noChangeAspect="1"/>
-          </p:cNvPicPr>
-          <p:nvPr/>
-        </p:nvPicPr>
-        <p:blipFill>
-          <a:blip r:embed="rId2"/>
-          <a:stretch>
-            <a:fillRect/>
-          </a:stretch>
-        </p:blipFill>
-        <p:spPr>
-          <a:xfrm>
-            <a:off x="3859936" y="805304"/>
-            <a:ext cx="5284064" cy="5683364"/>
-          </a:xfrm>
-          <a:prstGeom prst="rect">
-            <a:avLst/>
-          </a:prstGeom>
-        </p:spPr>
-      </p:pic>
       <p:sp>
         <p:nvSpPr>
           <p:cNvPr id="5" name="TextBox 4"/>
@@ -9610,6 +11752,473 @@
       </p:sp>
       <p:sp>
         <p:nvSpPr>
+          <p:cNvPr id="13" name="Rectangle 12"/>
+          <p:cNvSpPr/>
+          <p:nvPr/>
+        </p:nvSpPr>
+        <p:spPr>
+          <a:xfrm>
+            <a:off x="0" y="2408055"/>
+            <a:ext cx="3486393" cy="1206514"/>
+          </a:xfrm>
+          <a:prstGeom prst="rect">
+            <a:avLst/>
+          </a:prstGeom>
+          <a:noFill/>
+          <a:ln w="28575" cmpd="sng">
+            <a:solidFill>
+              <a:srgbClr val="FF6600"/>
+            </a:solidFill>
+          </a:ln>
+          <a:effectLst/>
+        </p:spPr>
+        <p:style>
+          <a:lnRef idx="1">
+            <a:schemeClr val="accent1"/>
+          </a:lnRef>
+          <a:fillRef idx="3">
+            <a:schemeClr val="accent1"/>
+          </a:fillRef>
+          <a:effectRef idx="2">
+            <a:schemeClr val="accent1"/>
+          </a:effectRef>
+          <a:fontRef idx="minor">
+            <a:schemeClr val="lt1"/>
+          </a:fontRef>
+        </p:style>
+        <p:txBody>
+          <a:bodyPr rtlCol="0" anchor="ctr"/>
+          <a:lstStyle/>
+          <a:p>
+            <a:pPr algn="ctr"/>
+            <a:endParaRPr lang="en-US"/>
+          </a:p>
+        </p:txBody>
+      </p:sp>
+      <p:grpSp>
+        <p:nvGrpSpPr>
+          <p:cNvPr id="21" name="Group 20"/>
+          <p:cNvGrpSpPr/>
+          <p:nvPr/>
+        </p:nvGrpSpPr>
+        <p:grpSpPr>
+          <a:xfrm>
+            <a:off x="3859936" y="805304"/>
+            <a:ext cx="5284064" cy="5683364"/>
+            <a:chOff x="3859936" y="805304"/>
+            <a:chExt cx="5284064" cy="5683364"/>
+          </a:xfrm>
+        </p:grpSpPr>
+        <p:grpSp>
+          <p:nvGrpSpPr>
+            <p:cNvPr id="3" name="Group 2"/>
+            <p:cNvGrpSpPr/>
+            <p:nvPr/>
+          </p:nvGrpSpPr>
+          <p:grpSpPr>
+            <a:xfrm>
+              <a:off x="3859936" y="805304"/>
+              <a:ext cx="5284064" cy="5683364"/>
+              <a:chOff x="3859936" y="805304"/>
+              <a:chExt cx="5284064" cy="5683364"/>
+            </a:xfrm>
+          </p:grpSpPr>
+          <p:pic>
+            <p:nvPicPr>
+              <p:cNvPr id="4" name="Picture 3"/>
+              <p:cNvPicPr>
+                <a:picLocks noChangeAspect="1"/>
+              </p:cNvPicPr>
+              <p:nvPr/>
+            </p:nvPicPr>
+            <p:blipFill>
+              <a:blip r:embed="rId2"/>
+              <a:stretch>
+                <a:fillRect/>
+              </a:stretch>
+            </p:blipFill>
+            <p:spPr>
+              <a:xfrm>
+                <a:off x="3859936" y="805304"/>
+                <a:ext cx="5284064" cy="5683364"/>
+              </a:xfrm>
+              <a:prstGeom prst="rect">
+                <a:avLst/>
+              </a:prstGeom>
+            </p:spPr>
+          </p:pic>
+          <p:sp>
+            <p:nvSpPr>
+              <p:cNvPr id="2" name="Oval 1"/>
+              <p:cNvSpPr/>
+              <p:nvPr/>
+            </p:nvSpPr>
+            <p:spPr>
+              <a:xfrm>
+                <a:off x="6387547" y="1046921"/>
+                <a:ext cx="265044" cy="296709"/>
+              </a:xfrm>
+              <a:prstGeom prst="ellipse">
+                <a:avLst/>
+              </a:prstGeom>
+              <a:solidFill>
+                <a:schemeClr val="bg1"/>
+              </a:solidFill>
+              <a:ln>
+                <a:noFill/>
+              </a:ln>
+            </p:spPr>
+            <p:style>
+              <a:lnRef idx="2">
+                <a:schemeClr val="accent1">
+                  <a:shade val="50000"/>
+                </a:schemeClr>
+              </a:lnRef>
+              <a:fillRef idx="1">
+                <a:schemeClr val="accent1"/>
+              </a:fillRef>
+              <a:effectRef idx="0">
+                <a:schemeClr val="accent1"/>
+              </a:effectRef>
+              <a:fontRef idx="minor">
+                <a:schemeClr val="lt1"/>
+              </a:fontRef>
+            </p:style>
+            <p:txBody>
+              <a:bodyPr rtlCol="0" anchor="ctr"/>
+              <a:lstStyle/>
+              <a:p>
+                <a:pPr algn="ctr"/>
+                <a:endParaRPr lang="en-US"/>
+              </a:p>
+            </p:txBody>
+          </p:sp>
+          <p:sp>
+            <p:nvSpPr>
+              <p:cNvPr id="14" name="Oval 13"/>
+              <p:cNvSpPr/>
+              <p:nvPr/>
+            </p:nvSpPr>
+            <p:spPr>
+              <a:xfrm>
+                <a:off x="6660684" y="993677"/>
+                <a:ext cx="265044" cy="296709"/>
+              </a:xfrm>
+              <a:prstGeom prst="ellipse">
+                <a:avLst/>
+              </a:prstGeom>
+              <a:solidFill>
+                <a:schemeClr val="bg1"/>
+              </a:solidFill>
+              <a:ln>
+                <a:noFill/>
+              </a:ln>
+            </p:spPr>
+            <p:style>
+              <a:lnRef idx="2">
+                <a:schemeClr val="accent1">
+                  <a:shade val="50000"/>
+                </a:schemeClr>
+              </a:lnRef>
+              <a:fillRef idx="1">
+                <a:schemeClr val="accent1"/>
+              </a:fillRef>
+              <a:effectRef idx="0">
+                <a:schemeClr val="accent1"/>
+              </a:effectRef>
+              <a:fontRef idx="minor">
+                <a:schemeClr val="lt1"/>
+              </a:fontRef>
+            </p:style>
+            <p:txBody>
+              <a:bodyPr rtlCol="0" anchor="ctr"/>
+              <a:lstStyle/>
+              <a:p>
+                <a:pPr algn="ctr"/>
+                <a:endParaRPr lang="en-US"/>
+              </a:p>
+            </p:txBody>
+          </p:sp>
+          <p:sp>
+            <p:nvSpPr>
+              <p:cNvPr id="15" name="Oval 14"/>
+              <p:cNvSpPr/>
+              <p:nvPr/>
+            </p:nvSpPr>
+            <p:spPr>
+              <a:xfrm>
+                <a:off x="7169427" y="1046921"/>
+                <a:ext cx="265044" cy="296709"/>
+              </a:xfrm>
+              <a:prstGeom prst="ellipse">
+                <a:avLst/>
+              </a:prstGeom>
+              <a:solidFill>
+                <a:schemeClr val="bg1"/>
+              </a:solidFill>
+              <a:ln>
+                <a:noFill/>
+              </a:ln>
+            </p:spPr>
+            <p:style>
+              <a:lnRef idx="2">
+                <a:schemeClr val="accent1">
+                  <a:shade val="50000"/>
+                </a:schemeClr>
+              </a:lnRef>
+              <a:fillRef idx="1">
+                <a:schemeClr val="accent1"/>
+              </a:fillRef>
+              <a:effectRef idx="0">
+                <a:schemeClr val="accent1"/>
+              </a:effectRef>
+              <a:fontRef idx="minor">
+                <a:schemeClr val="lt1"/>
+              </a:fontRef>
+            </p:style>
+            <p:txBody>
+              <a:bodyPr rtlCol="0" anchor="ctr"/>
+              <a:lstStyle/>
+              <a:p>
+                <a:pPr algn="ctr"/>
+                <a:endParaRPr lang="en-US"/>
+              </a:p>
+            </p:txBody>
+          </p:sp>
+          <p:sp>
+            <p:nvSpPr>
+              <p:cNvPr id="16" name="Oval 15"/>
+              <p:cNvSpPr/>
+              <p:nvPr/>
+            </p:nvSpPr>
+            <p:spPr>
+              <a:xfrm>
+                <a:off x="7460974" y="848141"/>
+                <a:ext cx="265044" cy="296709"/>
+              </a:xfrm>
+              <a:prstGeom prst="ellipse">
+                <a:avLst/>
+              </a:prstGeom>
+              <a:solidFill>
+                <a:schemeClr val="bg1"/>
+              </a:solidFill>
+              <a:ln>
+                <a:noFill/>
+              </a:ln>
+            </p:spPr>
+            <p:style>
+              <a:lnRef idx="2">
+                <a:schemeClr val="accent1">
+                  <a:shade val="50000"/>
+                </a:schemeClr>
+              </a:lnRef>
+              <a:fillRef idx="1">
+                <a:schemeClr val="accent1"/>
+              </a:fillRef>
+              <a:effectRef idx="0">
+                <a:schemeClr val="accent1"/>
+              </a:effectRef>
+              <a:fontRef idx="minor">
+                <a:schemeClr val="lt1"/>
+              </a:fontRef>
+            </p:style>
+            <p:txBody>
+              <a:bodyPr rtlCol="0" anchor="ctr"/>
+              <a:lstStyle/>
+              <a:p>
+                <a:pPr algn="ctr"/>
+                <a:endParaRPr lang="en-US"/>
+              </a:p>
+            </p:txBody>
+          </p:sp>
+          <p:sp>
+            <p:nvSpPr>
+              <p:cNvPr id="17" name="Oval 16"/>
+              <p:cNvSpPr/>
+              <p:nvPr/>
+            </p:nvSpPr>
+            <p:spPr>
+              <a:xfrm>
+                <a:off x="7924799" y="1033669"/>
+                <a:ext cx="265044" cy="296709"/>
+              </a:xfrm>
+              <a:prstGeom prst="ellipse">
+                <a:avLst/>
+              </a:prstGeom>
+              <a:solidFill>
+                <a:schemeClr val="bg1"/>
+              </a:solidFill>
+              <a:ln>
+                <a:noFill/>
+              </a:ln>
+            </p:spPr>
+            <p:style>
+              <a:lnRef idx="2">
+                <a:schemeClr val="accent1">
+                  <a:shade val="50000"/>
+                </a:schemeClr>
+              </a:lnRef>
+              <a:fillRef idx="1">
+                <a:schemeClr val="accent1"/>
+              </a:fillRef>
+              <a:effectRef idx="0">
+                <a:schemeClr val="accent1"/>
+              </a:effectRef>
+              <a:fontRef idx="minor">
+                <a:schemeClr val="lt1"/>
+              </a:fontRef>
+            </p:style>
+            <p:txBody>
+              <a:bodyPr rtlCol="0" anchor="ctr"/>
+              <a:lstStyle/>
+              <a:p>
+                <a:pPr algn="ctr"/>
+                <a:endParaRPr lang="en-US"/>
+              </a:p>
+            </p:txBody>
+          </p:sp>
+        </p:grpSp>
+        <p:sp>
+          <p:nvSpPr>
+            <p:cNvPr id="18" name="Rectangle 17"/>
+            <p:cNvSpPr/>
+            <p:nvPr/>
+          </p:nvSpPr>
+          <p:spPr>
+            <a:xfrm>
+              <a:off x="8203095" y="805304"/>
+              <a:ext cx="808383" cy="1169270"/>
+            </a:xfrm>
+            <a:prstGeom prst="rect">
+              <a:avLst/>
+            </a:prstGeom>
+            <a:solidFill>
+              <a:schemeClr val="bg1"/>
+            </a:solidFill>
+            <a:ln>
+              <a:noFill/>
+            </a:ln>
+          </p:spPr>
+          <p:style>
+            <a:lnRef idx="2">
+              <a:schemeClr val="accent1">
+                <a:shade val="50000"/>
+              </a:schemeClr>
+            </a:lnRef>
+            <a:fillRef idx="1">
+              <a:schemeClr val="accent1"/>
+            </a:fillRef>
+            <a:effectRef idx="0">
+              <a:schemeClr val="accent1"/>
+            </a:effectRef>
+            <a:fontRef idx="minor">
+              <a:schemeClr val="lt1"/>
+            </a:fontRef>
+          </p:style>
+          <p:txBody>
+            <a:bodyPr rtlCol="0" anchor="ctr"/>
+            <a:lstStyle/>
+            <a:p>
+              <a:pPr algn="ctr"/>
+              <a:endParaRPr lang="en-US"/>
+            </a:p>
+          </p:txBody>
+        </p:sp>
+        <p:sp>
+          <p:nvSpPr>
+            <p:cNvPr id="19" name="Rectangle 18"/>
+            <p:cNvSpPr/>
+            <p:nvPr/>
+          </p:nvSpPr>
+          <p:spPr>
+            <a:xfrm>
+              <a:off x="4038972" y="2202939"/>
+              <a:ext cx="4455671" cy="4232485"/>
+            </a:xfrm>
+            <a:prstGeom prst="rect">
+              <a:avLst/>
+            </a:prstGeom>
+            <a:solidFill>
+              <a:schemeClr val="bg1"/>
+            </a:solidFill>
+            <a:ln>
+              <a:noFill/>
+            </a:ln>
+          </p:spPr>
+          <p:style>
+            <a:lnRef idx="2">
+              <a:schemeClr val="accent1">
+                <a:shade val="50000"/>
+              </a:schemeClr>
+            </a:lnRef>
+            <a:fillRef idx="1">
+              <a:schemeClr val="accent1"/>
+            </a:fillRef>
+            <a:effectRef idx="0">
+              <a:schemeClr val="accent1"/>
+            </a:effectRef>
+            <a:fontRef idx="minor">
+              <a:schemeClr val="lt1"/>
+            </a:fontRef>
+          </p:style>
+          <p:txBody>
+            <a:bodyPr rtlCol="0" anchor="ctr"/>
+            <a:lstStyle/>
+            <a:p>
+              <a:pPr algn="ctr"/>
+              <a:endParaRPr lang="en-US"/>
+            </a:p>
+          </p:txBody>
+        </p:sp>
+        <p:sp>
+          <p:nvSpPr>
+            <p:cNvPr id="20" name="Rectangle 19"/>
+            <p:cNvSpPr/>
+            <p:nvPr/>
+          </p:nvSpPr>
+          <p:spPr>
+            <a:xfrm>
+              <a:off x="5300870" y="1343629"/>
+              <a:ext cx="907585" cy="973741"/>
+            </a:xfrm>
+            <a:prstGeom prst="rect">
+              <a:avLst/>
+            </a:prstGeom>
+            <a:solidFill>
+              <a:schemeClr val="bg1"/>
+            </a:solidFill>
+            <a:ln>
+              <a:noFill/>
+            </a:ln>
+          </p:spPr>
+          <p:style>
+            <a:lnRef idx="2">
+              <a:schemeClr val="accent1">
+                <a:shade val="50000"/>
+              </a:schemeClr>
+            </a:lnRef>
+            <a:fillRef idx="1">
+              <a:schemeClr val="accent1"/>
+            </a:fillRef>
+            <a:effectRef idx="0">
+              <a:schemeClr val="accent1"/>
+            </a:effectRef>
+            <a:fontRef idx="minor">
+              <a:schemeClr val="lt1"/>
+            </a:fontRef>
+          </p:style>
+          <p:txBody>
+            <a:bodyPr rtlCol="0" anchor="ctr"/>
+            <a:lstStyle/>
+            <a:p>
+              <a:pPr algn="ctr"/>
+              <a:endParaRPr lang="en-US"/>
+            </a:p>
+          </p:txBody>
+        </p:sp>
+      </p:grpSp>
+      <p:sp>
+        <p:nvSpPr>
           <p:cNvPr id="12" name="Rectangle 11"/>
           <p:cNvSpPr/>
           <p:nvPr/>
@@ -9653,51 +12262,6 @@
           </a:p>
         </p:txBody>
       </p:sp>
-      <p:sp>
-        <p:nvSpPr>
-          <p:cNvPr id="13" name="Rectangle 12"/>
-          <p:cNvSpPr/>
-          <p:nvPr/>
-        </p:nvSpPr>
-        <p:spPr>
-          <a:xfrm>
-            <a:off x="0" y="2332730"/>
-            <a:ext cx="3486393" cy="1340643"/>
-          </a:xfrm>
-          <a:prstGeom prst="rect">
-            <a:avLst/>
-          </a:prstGeom>
-          <a:noFill/>
-          <a:ln w="28575" cmpd="sng">
-            <a:solidFill>
-              <a:srgbClr val="FF6600"/>
-            </a:solidFill>
-          </a:ln>
-          <a:effectLst/>
-        </p:spPr>
-        <p:style>
-          <a:lnRef idx="1">
-            <a:schemeClr val="accent1"/>
-          </a:lnRef>
-          <a:fillRef idx="3">
-            <a:schemeClr val="accent1"/>
-          </a:fillRef>
-          <a:effectRef idx="2">
-            <a:schemeClr val="accent1"/>
-          </a:effectRef>
-          <a:fontRef idx="minor">
-            <a:schemeClr val="lt1"/>
-          </a:fontRef>
-        </p:style>
-        <p:txBody>
-          <a:bodyPr rtlCol="0" anchor="ctr"/>
-          <a:lstStyle/>
-          <a:p>
-            <a:pPr algn="ctr"/>
-            <a:endParaRPr lang="en-US"/>
-          </a:p>
-        </p:txBody>
-      </p:sp>
     </p:spTree>
     <p:extLst>
       <p:ext uri="{BB962C8B-B14F-4D97-AF65-F5344CB8AC3E}">
@@ -9711,14 +12275,14 @@
   <p:timing>
     <p:tnLst>
       <p:par>
-        <p:cTn xmlns:p14="http://schemas.microsoft.com/office/powerpoint/2010/main" id="1" dur="indefinite" restart="never" nodeType="tmRoot"/>
+        <p:cTn id="1" dur="indefinite" restart="never" nodeType="tmRoot"/>
       </p:par>
     </p:tnLst>
   </p:timing>
 </p:sld>
 </file>
 
-<file path=ppt/slides/slide7.xml><?xml version="1.0" encoding="utf-8"?>
+<file path=ppt/slides/slide8.xml><?xml version="1.0" encoding="utf-8"?>
 <p:sld xmlns:a="http://schemas.openxmlformats.org/drawingml/2006/main" xmlns:r="http://schemas.openxmlformats.org/officeDocument/2006/relationships" xmlns:p="http://schemas.openxmlformats.org/presentationml/2006/main">
   <p:cSld>
     <p:spTree>
@@ -10607,6 +13171,98 @@
       </p:sp>
       <p:sp>
         <p:nvSpPr>
+          <p:cNvPr id="14" name="Rectangle 13"/>
+          <p:cNvSpPr/>
+          <p:nvPr/>
+        </p:nvSpPr>
+        <p:spPr>
+          <a:xfrm>
+            <a:off x="4038972" y="2202939"/>
+            <a:ext cx="4455671" cy="4232485"/>
+          </a:xfrm>
+          <a:prstGeom prst="rect">
+            <a:avLst/>
+          </a:prstGeom>
+          <a:solidFill>
+            <a:schemeClr val="bg1"/>
+          </a:solidFill>
+          <a:ln>
+            <a:noFill/>
+          </a:ln>
+        </p:spPr>
+        <p:style>
+          <a:lnRef idx="2">
+            <a:schemeClr val="accent1">
+              <a:shade val="50000"/>
+            </a:schemeClr>
+          </a:lnRef>
+          <a:fillRef idx="1">
+            <a:schemeClr val="accent1"/>
+          </a:fillRef>
+          <a:effectRef idx="0">
+            <a:schemeClr val="accent1"/>
+          </a:effectRef>
+          <a:fontRef idx="minor">
+            <a:schemeClr val="lt1"/>
+          </a:fontRef>
+        </p:style>
+        <p:txBody>
+          <a:bodyPr rtlCol="0" anchor="ctr"/>
+          <a:lstStyle/>
+          <a:p>
+            <a:pPr algn="ctr"/>
+            <a:endParaRPr lang="en-US"/>
+          </a:p>
+        </p:txBody>
+      </p:sp>
+      <p:sp>
+        <p:nvSpPr>
+          <p:cNvPr id="15" name="Rectangle 14"/>
+          <p:cNvSpPr/>
+          <p:nvPr/>
+        </p:nvSpPr>
+        <p:spPr>
+          <a:xfrm>
+            <a:off x="5300870" y="1714690"/>
+            <a:ext cx="907585" cy="973741"/>
+          </a:xfrm>
+          <a:prstGeom prst="rect">
+            <a:avLst/>
+          </a:prstGeom>
+          <a:solidFill>
+            <a:schemeClr val="bg1"/>
+          </a:solidFill>
+          <a:ln>
+            <a:noFill/>
+          </a:ln>
+        </p:spPr>
+        <p:style>
+          <a:lnRef idx="2">
+            <a:schemeClr val="accent1">
+              <a:shade val="50000"/>
+            </a:schemeClr>
+          </a:lnRef>
+          <a:fillRef idx="1">
+            <a:schemeClr val="accent1"/>
+          </a:fillRef>
+          <a:effectRef idx="0">
+            <a:schemeClr val="accent1"/>
+          </a:effectRef>
+          <a:fontRef idx="minor">
+            <a:schemeClr val="lt1"/>
+          </a:fontRef>
+        </p:style>
+        <p:txBody>
+          <a:bodyPr rtlCol="0" anchor="ctr"/>
+          <a:lstStyle/>
+          <a:p>
+            <a:pPr algn="ctr"/>
+            <a:endParaRPr lang="en-US"/>
+          </a:p>
+        </p:txBody>
+      </p:sp>
+      <p:sp>
+        <p:nvSpPr>
           <p:cNvPr id="12" name="Rectangle 11"/>
           <p:cNvSpPr/>
           <p:nvPr/>
@@ -10708,14 +13364,14 @@
   <p:timing>
     <p:tnLst>
       <p:par>
-        <p:cTn xmlns:p14="http://schemas.microsoft.com/office/powerpoint/2010/main" id="1" dur="indefinite" restart="never" nodeType="tmRoot"/>
+        <p:cTn id="1" dur="indefinite" restart="never" nodeType="tmRoot"/>
       </p:par>
     </p:tnLst>
   </p:timing>
 </p:sld>
 </file>
 
-<file path=ppt/slides/slide8.xml><?xml version="1.0" encoding="utf-8"?>
+<file path=ppt/slides/slide9.xml><?xml version="1.0" encoding="utf-8"?>
 <p:sld xmlns:a="http://schemas.openxmlformats.org/drawingml/2006/main" xmlns:r="http://schemas.openxmlformats.org/officeDocument/2006/relationships" xmlns:p="http://schemas.openxmlformats.org/presentationml/2006/main">
   <p:cSld>
     <p:spTree>
@@ -11573,51 +14229,6 @@
       </p:sp>
       <p:sp>
         <p:nvSpPr>
-          <p:cNvPr id="12" name="Rectangle 11"/>
-          <p:cNvSpPr/>
-          <p:nvPr/>
-        </p:nvSpPr>
-        <p:spPr>
-          <a:xfrm>
-            <a:off x="0" y="2332730"/>
-            <a:ext cx="3486393" cy="1340643"/>
-          </a:xfrm>
-          <a:prstGeom prst="rect">
-            <a:avLst/>
-          </a:prstGeom>
-          <a:noFill/>
-          <a:ln w="28575" cmpd="sng">
-            <a:solidFill>
-              <a:srgbClr val="FF6600"/>
-            </a:solidFill>
-          </a:ln>
-          <a:effectLst/>
-        </p:spPr>
-        <p:style>
-          <a:lnRef idx="1">
-            <a:schemeClr val="accent1"/>
-          </a:lnRef>
-          <a:fillRef idx="3">
-            <a:schemeClr val="accent1"/>
-          </a:fillRef>
-          <a:effectRef idx="2">
-            <a:schemeClr val="accent1"/>
-          </a:effectRef>
-          <a:fontRef idx="minor">
-            <a:schemeClr val="lt1"/>
-          </a:fontRef>
-        </p:style>
-        <p:txBody>
-          <a:bodyPr rtlCol="0" anchor="ctr"/>
-          <a:lstStyle/>
-          <a:p>
-            <a:pPr algn="ctr"/>
-            <a:endParaRPr lang="en-US"/>
-          </a:p>
-        </p:txBody>
-      </p:sp>
-      <p:sp>
-        <p:nvSpPr>
           <p:cNvPr id="13" name="Title 1"/>
           <p:cNvSpPr txBox="1">
             <a:spLocks/>
@@ -11710,910 +14321,49 @@
           </a:p>
         </p:txBody>
       </p:sp>
-    </p:spTree>
-    <p:extLst>
-      <p:ext uri="{BB962C8B-B14F-4D97-AF65-F5344CB8AC3E}">
-        <p14:creationId xmlns:p14="http://schemas.microsoft.com/office/powerpoint/2010/main" val="3446328257"/>
-      </p:ext>
-    </p:extLst>
-  </p:cSld>
-  <p:clrMapOvr>
-    <a:masterClrMapping/>
-  </p:clrMapOvr>
-  <p:timing>
-    <p:tnLst>
-      <p:par>
-        <p:cTn xmlns:p14="http://schemas.microsoft.com/office/powerpoint/2010/main" id="1" dur="indefinite" restart="never" nodeType="tmRoot"/>
-      </p:par>
-    </p:tnLst>
-  </p:timing>
-</p:sld>
-</file>
-
-<file path=ppt/slides/slide9.xml><?xml version="1.0" encoding="utf-8"?>
-<p:sld xmlns:a="http://schemas.openxmlformats.org/drawingml/2006/main" xmlns:r="http://schemas.openxmlformats.org/officeDocument/2006/relationships" xmlns:p="http://schemas.openxmlformats.org/presentationml/2006/main">
-  <p:cSld>
-    <p:spTree>
-      <p:nvGrpSpPr>
-        <p:cNvPr id="1" name=""/>
-        <p:cNvGrpSpPr/>
-        <p:nvPr/>
-      </p:nvGrpSpPr>
-      <p:grpSpPr>
-        <a:xfrm>
-          <a:off x="0" y="0"/>
-          <a:ext cx="0" cy="0"/>
-          <a:chOff x="0" y="0"/>
-          <a:chExt cx="0" cy="0"/>
-        </a:xfrm>
-      </p:grpSpPr>
-      <p:pic>
-        <p:nvPicPr>
-          <p:cNvPr id="4" name="Picture 3"/>
-          <p:cNvPicPr>
-            <a:picLocks noChangeAspect="1"/>
-          </p:cNvPicPr>
+      <p:sp>
+        <p:nvSpPr>
+          <p:cNvPr id="15" name="Rectangle 14"/>
+          <p:cNvSpPr/>
           <p:nvPr/>
-        </p:nvPicPr>
-        <p:blipFill>
-          <a:blip r:embed="rId2"/>
-          <a:stretch>
-            <a:fillRect/>
-          </a:stretch>
-        </p:blipFill>
+        </p:nvSpPr>
         <p:spPr>
           <a:xfrm>
-            <a:off x="3859936" y="805304"/>
-            <a:ext cx="5284064" cy="5683364"/>
+            <a:off x="4038972" y="3803374"/>
+            <a:ext cx="4455671" cy="2632050"/>
           </a:xfrm>
           <a:prstGeom prst="rect">
             <a:avLst/>
           </a:prstGeom>
+          <a:solidFill>
+            <a:schemeClr val="bg1"/>
+          </a:solidFill>
+          <a:ln>
+            <a:noFill/>
+          </a:ln>
         </p:spPr>
-      </p:pic>
-      <p:sp>
-        <p:nvSpPr>
-          <p:cNvPr id="5" name="TextBox 4"/>
-          <p:cNvSpPr txBox="1"/>
-          <p:nvPr/>
-        </p:nvSpPr>
-        <p:spPr>
-          <a:xfrm>
-            <a:off x="7325290" y="6488668"/>
-            <a:ext cx="1818710" cy="369332"/>
-          </a:xfrm>
-          <a:prstGeom prst="rect">
-            <a:avLst/>
-          </a:prstGeom>
-          <a:noFill/>
-        </p:spPr>
+        <p:style>
+          <a:lnRef idx="2">
+            <a:schemeClr val="accent1">
+              <a:shade val="50000"/>
+            </a:schemeClr>
+          </a:lnRef>
+          <a:fillRef idx="1">
+            <a:schemeClr val="accent1"/>
+          </a:fillRef>
+          <a:effectRef idx="0">
+            <a:schemeClr val="accent1"/>
+          </a:effectRef>
+          <a:fontRef idx="minor">
+            <a:schemeClr val="lt1"/>
+          </a:fontRef>
+        </p:style>
         <p:txBody>
-          <a:bodyPr wrap="square" rtlCol="0">
-            <a:spAutoFit/>
-          </a:bodyPr>
+          <a:bodyPr rtlCol="0" anchor="ctr"/>
           <a:lstStyle/>
           <a:p>
-            <a:r>
-              <a:rPr lang="en-US" dirty="0" err="1" smtClean="0"/>
-              <a:t>Pachter</a:t>
-            </a:r>
-            <a:r>
-              <a:rPr lang="en-US" dirty="0" smtClean="0"/>
-              <a:t> 2011</a:t>
-            </a:r>
-            <a:endParaRPr lang="en-US" dirty="0"/>
-          </a:p>
-        </p:txBody>
-      </p:sp>
-      <p:graphicFrame>
-        <p:nvGraphicFramePr>
-          <p:cNvPr id="7" name="Table 6"/>
-          <p:cNvGraphicFramePr>
-            <a:graphicFrameLocks noGrp="1"/>
-          </p:cNvGraphicFramePr>
-          <p:nvPr>
-            <p:extLst>
-              <p:ext uri="{D42A27DB-BD31-4B8C-83A1-F6EECF244321}">
-                <p14:modId xmlns:p14="http://schemas.microsoft.com/office/powerpoint/2010/main" val="3744843095"/>
-              </p:ext>
-            </p:extLst>
-          </p:nvPr>
-        </p:nvGraphicFramePr>
-        <p:xfrm>
-          <a:off x="728262" y="3942808"/>
-          <a:ext cx="2646068" cy="2545860"/>
-        </p:xfrm>
-        <a:graphic>
-          <a:graphicData uri="http://schemas.openxmlformats.org/drawingml/2006/table">
-            <a:tbl>
-              <a:tblPr firstRow="1" bandRow="1">
-                <a:tableStyleId>{D03447BB-5D67-496B-8E87-E561075AD55C}</a:tableStyleId>
-              </a:tblPr>
-              <a:tblGrid>
-                <a:gridCol w="342560"/>
-                <a:gridCol w="767836"/>
-                <a:gridCol w="767836"/>
-                <a:gridCol w="767836"/>
-              </a:tblGrid>
-              <a:tr h="424310">
-                <a:tc>
-                  <a:txBody>
-                    <a:bodyPr/>
-                    <a:lstStyle/>
-                    <a:p>
-                      <a:pPr algn="ctr"/>
-                      <a:endParaRPr lang="en-US" sz="1800" dirty="0"/>
-                    </a:p>
-                  </a:txBody>
-                  <a:tcPr anchor="ctr"/>
-                </a:tc>
-                <a:tc>
-                  <a:txBody>
-                    <a:bodyPr/>
-                    <a:lstStyle/>
-                    <a:p>
-                      <a:pPr algn="ctr"/>
-                      <a:r>
-                        <a:rPr lang="en-US" sz="1800" dirty="0" smtClean="0">
-                          <a:solidFill>
-                            <a:srgbClr val="FF0000"/>
-                          </a:solidFill>
-                        </a:rPr>
-                        <a:t>red</a:t>
-                      </a:r>
-                      <a:endParaRPr lang="en-US" sz="1800" dirty="0">
-                        <a:solidFill>
-                          <a:srgbClr val="FF0000"/>
-                        </a:solidFill>
-                      </a:endParaRPr>
-                    </a:p>
-                  </a:txBody>
-                  <a:tcPr anchor="ctr"/>
-                </a:tc>
-                <a:tc>
-                  <a:txBody>
-                    <a:bodyPr/>
-                    <a:lstStyle/>
-                    <a:p>
-                      <a:pPr algn="ctr"/>
-                      <a:r>
-                        <a:rPr lang="en-US" sz="1800" dirty="0" smtClean="0">
-                          <a:solidFill>
-                            <a:srgbClr val="23FF06"/>
-                          </a:solidFill>
-                        </a:rPr>
-                        <a:t>green</a:t>
-                      </a:r>
-                      <a:endParaRPr lang="en-US" sz="1800" dirty="0">
-                        <a:solidFill>
-                          <a:srgbClr val="23FF06"/>
-                        </a:solidFill>
-                      </a:endParaRPr>
-                    </a:p>
-                  </a:txBody>
-                  <a:tcPr anchor="ctr"/>
-                </a:tc>
-                <a:tc>
-                  <a:txBody>
-                    <a:bodyPr/>
-                    <a:lstStyle/>
-                    <a:p>
-                      <a:pPr algn="ctr"/>
-                      <a:r>
-                        <a:rPr lang="en-US" sz="1800" dirty="0" smtClean="0">
-                          <a:solidFill>
-                            <a:srgbClr val="0000FF"/>
-                          </a:solidFill>
-                        </a:rPr>
-                        <a:t>blue</a:t>
-                      </a:r>
-                      <a:endParaRPr lang="en-US" sz="1800" dirty="0">
-                        <a:solidFill>
-                          <a:srgbClr val="0000FF"/>
-                        </a:solidFill>
-                      </a:endParaRPr>
-                    </a:p>
-                  </a:txBody>
-                  <a:tcPr anchor="ctr"/>
-                </a:tc>
-              </a:tr>
-              <a:tr h="424310">
-                <a:tc>
-                  <a:txBody>
-                    <a:bodyPr/>
-                    <a:lstStyle/>
-                    <a:p>
-                      <a:pPr algn="ctr"/>
-                      <a:r>
-                        <a:rPr lang="en-US" sz="1800" dirty="0" smtClean="0"/>
-                        <a:t>a</a:t>
-                      </a:r>
-                      <a:endParaRPr lang="en-US" sz="1800" dirty="0"/>
-                    </a:p>
-                  </a:txBody>
-                  <a:tcPr anchor="ctr"/>
-                </a:tc>
-                <a:tc>
-                  <a:txBody>
-                    <a:bodyPr/>
-                    <a:lstStyle/>
-                    <a:p>
-                      <a:pPr algn="ctr"/>
-                      <a:r>
-                        <a:rPr lang="en-US" sz="1800" dirty="0" smtClean="0">
-                          <a:solidFill>
-                            <a:srgbClr val="FF0000"/>
-                          </a:solidFill>
-                        </a:rPr>
-                        <a:t>0.467</a:t>
-                      </a:r>
-                      <a:endParaRPr lang="en-US" sz="1800" dirty="0">
-                        <a:solidFill>
-                          <a:srgbClr val="FF0000"/>
-                        </a:solidFill>
-                      </a:endParaRPr>
-                    </a:p>
-                  </a:txBody>
-                  <a:tcPr anchor="ctr"/>
-                </a:tc>
-                <a:tc>
-                  <a:txBody>
-                    <a:bodyPr/>
-                    <a:lstStyle/>
-                    <a:p>
-                      <a:pPr algn="ctr"/>
-                      <a:r>
-                        <a:rPr lang="en-US" sz="1800" dirty="0" smtClean="0">
-                          <a:solidFill>
-                            <a:srgbClr val="23FF06"/>
-                          </a:solidFill>
-                        </a:rPr>
-                        <a:t>0.267</a:t>
-                      </a:r>
-                      <a:endParaRPr lang="en-US" sz="1800" dirty="0">
-                        <a:solidFill>
-                          <a:srgbClr val="23FF06"/>
-                        </a:solidFill>
-                      </a:endParaRPr>
-                    </a:p>
-                  </a:txBody>
-                  <a:tcPr anchor="ctr"/>
-                </a:tc>
-                <a:tc>
-                  <a:txBody>
-                    <a:bodyPr/>
-                    <a:lstStyle/>
-                    <a:p>
-                      <a:pPr algn="ctr"/>
-                      <a:r>
-                        <a:rPr lang="en-US" sz="1800" dirty="0" smtClean="0">
-                          <a:solidFill>
-                            <a:srgbClr val="0000FF"/>
-                          </a:solidFill>
-                        </a:rPr>
-                        <a:t>0.267</a:t>
-                      </a:r>
-                      <a:endParaRPr lang="en-US" sz="1800" dirty="0">
-                        <a:solidFill>
-                          <a:srgbClr val="0000FF"/>
-                        </a:solidFill>
-                      </a:endParaRPr>
-                    </a:p>
-                  </a:txBody>
-                  <a:tcPr anchor="ctr"/>
-                </a:tc>
-              </a:tr>
-              <a:tr h="424310">
-                <a:tc>
-                  <a:txBody>
-                    <a:bodyPr/>
-                    <a:lstStyle/>
-                    <a:p>
-                      <a:pPr algn="ctr"/>
-                      <a:r>
-                        <a:rPr lang="en-US" sz="1800" dirty="0" smtClean="0"/>
-                        <a:t>b</a:t>
-                      </a:r>
-                      <a:endParaRPr lang="en-US" sz="1800" dirty="0"/>
-                    </a:p>
-                  </a:txBody>
-                  <a:tcPr anchor="ctr"/>
-                </a:tc>
-                <a:tc>
-                  <a:txBody>
-                    <a:bodyPr/>
-                    <a:lstStyle/>
-                    <a:p>
-                      <a:pPr algn="ctr"/>
-                      <a:r>
-                        <a:rPr lang="en-US" sz="1800" dirty="0" smtClean="0">
-                          <a:solidFill>
-                            <a:srgbClr val="FF0000"/>
-                          </a:solidFill>
-                        </a:rPr>
-                        <a:t>0</a:t>
-                      </a:r>
-                      <a:endParaRPr lang="en-US" sz="1800" dirty="0">
-                        <a:solidFill>
-                          <a:srgbClr val="FF0000"/>
-                        </a:solidFill>
-                      </a:endParaRPr>
-                    </a:p>
-                  </a:txBody>
-                  <a:tcPr anchor="ctr"/>
-                </a:tc>
-                <a:tc>
-                  <a:txBody>
-                    <a:bodyPr/>
-                    <a:lstStyle/>
-                    <a:p>
-                      <a:pPr algn="ctr"/>
-                      <a:r>
-                        <a:rPr lang="en-US" sz="1800" dirty="0" smtClean="0">
-                          <a:solidFill>
-                            <a:srgbClr val="23FF06"/>
-                          </a:solidFill>
-                        </a:rPr>
-                        <a:t>1/2</a:t>
-                      </a:r>
-                      <a:endParaRPr lang="en-US" sz="1800" dirty="0">
-                        <a:solidFill>
-                          <a:srgbClr val="23FF06"/>
-                        </a:solidFill>
-                      </a:endParaRPr>
-                    </a:p>
-                  </a:txBody>
-                  <a:tcPr anchor="ctr"/>
-                </a:tc>
-                <a:tc>
-                  <a:txBody>
-                    <a:bodyPr/>
-                    <a:lstStyle/>
-                    <a:p>
-                      <a:pPr algn="ctr"/>
-                      <a:r>
-                        <a:rPr lang="en-US" sz="1800" dirty="0" smtClean="0">
-                          <a:solidFill>
-                            <a:srgbClr val="0000FF"/>
-                          </a:solidFill>
-                        </a:rPr>
-                        <a:t>1/2</a:t>
-                      </a:r>
-                      <a:endParaRPr lang="en-US" sz="1800" dirty="0">
-                        <a:solidFill>
-                          <a:srgbClr val="0000FF"/>
-                        </a:solidFill>
-                      </a:endParaRPr>
-                    </a:p>
-                  </a:txBody>
-                  <a:tcPr anchor="ctr"/>
-                </a:tc>
-              </a:tr>
-              <a:tr h="424310">
-                <a:tc>
-                  <a:txBody>
-                    <a:bodyPr/>
-                    <a:lstStyle/>
-                    <a:p>
-                      <a:pPr algn="ctr"/>
-                      <a:r>
-                        <a:rPr lang="en-US" sz="1800" dirty="0" smtClean="0"/>
-                        <a:t>c</a:t>
-                      </a:r>
-                      <a:endParaRPr lang="en-US" sz="1800" dirty="0"/>
-                    </a:p>
-                  </a:txBody>
-                  <a:tcPr anchor="ctr"/>
-                </a:tc>
-                <a:tc>
-                  <a:txBody>
-                    <a:bodyPr/>
-                    <a:lstStyle/>
-                    <a:p>
-                      <a:pPr algn="ctr"/>
-                      <a:r>
-                        <a:rPr lang="en-US" sz="1800" dirty="0" smtClean="0">
-                          <a:solidFill>
-                            <a:srgbClr val="FF0000"/>
-                          </a:solidFill>
-                        </a:rPr>
-                        <a:t>0.636</a:t>
-                      </a:r>
-                      <a:endParaRPr lang="en-US" sz="1800" dirty="0">
-                        <a:solidFill>
-                          <a:srgbClr val="FF0000"/>
-                        </a:solidFill>
-                      </a:endParaRPr>
-                    </a:p>
-                  </a:txBody>
-                  <a:tcPr anchor="ctr"/>
-                </a:tc>
-                <a:tc>
-                  <a:txBody>
-                    <a:bodyPr/>
-                    <a:lstStyle/>
-                    <a:p>
-                      <a:pPr algn="ctr"/>
-                      <a:r>
-                        <a:rPr lang="en-US" sz="1800" dirty="0" smtClean="0">
-                          <a:solidFill>
-                            <a:srgbClr val="23FF06"/>
-                          </a:solidFill>
-                        </a:rPr>
-                        <a:t>0</a:t>
-                      </a:r>
-                      <a:endParaRPr lang="en-US" sz="1800" dirty="0">
-                        <a:solidFill>
-                          <a:srgbClr val="23FF06"/>
-                        </a:solidFill>
-                      </a:endParaRPr>
-                    </a:p>
-                  </a:txBody>
-                  <a:tcPr anchor="ctr"/>
-                </a:tc>
-                <a:tc>
-                  <a:txBody>
-                    <a:bodyPr/>
-                    <a:lstStyle/>
-                    <a:p>
-                      <a:pPr algn="ctr"/>
-                      <a:r>
-                        <a:rPr lang="en-US" sz="1800" dirty="0" smtClean="0">
-                          <a:solidFill>
-                            <a:srgbClr val="0000FF"/>
-                          </a:solidFill>
-                        </a:rPr>
-                        <a:t>0.364</a:t>
-                      </a:r>
-                      <a:endParaRPr lang="en-US" sz="1800" dirty="0">
-                        <a:solidFill>
-                          <a:srgbClr val="0000FF"/>
-                        </a:solidFill>
-                      </a:endParaRPr>
-                    </a:p>
-                  </a:txBody>
-                  <a:tcPr anchor="ctr"/>
-                </a:tc>
-              </a:tr>
-              <a:tr h="424310">
-                <a:tc>
-                  <a:txBody>
-                    <a:bodyPr/>
-                    <a:lstStyle/>
-                    <a:p>
-                      <a:pPr algn="ctr"/>
-                      <a:r>
-                        <a:rPr lang="en-US" sz="1800" dirty="0" smtClean="0"/>
-                        <a:t>d</a:t>
-                      </a:r>
-                      <a:endParaRPr lang="en-US" sz="1800" dirty="0"/>
-                    </a:p>
-                  </a:txBody>
-                  <a:tcPr anchor="ctr"/>
-                </a:tc>
-                <a:tc>
-                  <a:txBody>
-                    <a:bodyPr/>
-                    <a:lstStyle/>
-                    <a:p>
-                      <a:pPr algn="ctr"/>
-                      <a:r>
-                        <a:rPr lang="en-US" sz="1800" dirty="0" smtClean="0">
-                          <a:solidFill>
-                            <a:srgbClr val="FF0000"/>
-                          </a:solidFill>
-                        </a:rPr>
-                        <a:t>1</a:t>
-                      </a:r>
-                      <a:endParaRPr lang="en-US" sz="1800" dirty="0">
-                        <a:solidFill>
-                          <a:srgbClr val="FF0000"/>
-                        </a:solidFill>
-                      </a:endParaRPr>
-                    </a:p>
-                  </a:txBody>
-                  <a:tcPr anchor="ctr"/>
-                </a:tc>
-                <a:tc>
-                  <a:txBody>
-                    <a:bodyPr/>
-                    <a:lstStyle/>
-                    <a:p>
-                      <a:pPr algn="ctr"/>
-                      <a:r>
-                        <a:rPr lang="en-US" sz="1800" dirty="0" smtClean="0">
-                          <a:solidFill>
-                            <a:srgbClr val="23FF06"/>
-                          </a:solidFill>
-                        </a:rPr>
-                        <a:t>0</a:t>
-                      </a:r>
-                      <a:endParaRPr lang="en-US" sz="1800" dirty="0">
-                        <a:solidFill>
-                          <a:srgbClr val="23FF06"/>
-                        </a:solidFill>
-                      </a:endParaRPr>
-                    </a:p>
-                  </a:txBody>
-                  <a:tcPr anchor="ctr"/>
-                </a:tc>
-                <a:tc>
-                  <a:txBody>
-                    <a:bodyPr/>
-                    <a:lstStyle/>
-                    <a:p>
-                      <a:pPr algn="ctr"/>
-                      <a:r>
-                        <a:rPr lang="en-US" sz="1800" dirty="0" smtClean="0">
-                          <a:solidFill>
-                            <a:srgbClr val="0000FF"/>
-                          </a:solidFill>
-                        </a:rPr>
-                        <a:t>0</a:t>
-                      </a:r>
-                      <a:endParaRPr lang="en-US" sz="1800" dirty="0">
-                        <a:solidFill>
-                          <a:srgbClr val="0000FF"/>
-                        </a:solidFill>
-                      </a:endParaRPr>
-                    </a:p>
-                  </a:txBody>
-                  <a:tcPr anchor="ctr"/>
-                </a:tc>
-              </a:tr>
-              <a:tr h="424310">
-                <a:tc>
-                  <a:txBody>
-                    <a:bodyPr/>
-                    <a:lstStyle/>
-                    <a:p>
-                      <a:pPr algn="ctr"/>
-                      <a:r>
-                        <a:rPr lang="en-US" sz="1800" dirty="0" smtClean="0"/>
-                        <a:t>e</a:t>
-                      </a:r>
-                      <a:endParaRPr lang="en-US" sz="1800" dirty="0"/>
-                    </a:p>
-                  </a:txBody>
-                  <a:tcPr anchor="ctr"/>
-                </a:tc>
-                <a:tc>
-                  <a:txBody>
-                    <a:bodyPr/>
-                    <a:lstStyle/>
-                    <a:p>
-                      <a:pPr algn="ctr"/>
-                      <a:r>
-                        <a:rPr lang="en-US" sz="1800" dirty="0" smtClean="0">
-                          <a:solidFill>
-                            <a:srgbClr val="FF0000"/>
-                          </a:solidFill>
-                        </a:rPr>
-                        <a:t>0.636</a:t>
-                      </a:r>
-                      <a:endParaRPr lang="en-US" sz="1800" dirty="0">
-                        <a:solidFill>
-                          <a:srgbClr val="FF0000"/>
-                        </a:solidFill>
-                      </a:endParaRPr>
-                    </a:p>
-                  </a:txBody>
-                  <a:tcPr anchor="ctr"/>
-                </a:tc>
-                <a:tc>
-                  <a:txBody>
-                    <a:bodyPr/>
-                    <a:lstStyle/>
-                    <a:p>
-                      <a:pPr algn="ctr"/>
-                      <a:r>
-                        <a:rPr lang="en-US" sz="1800" dirty="0" smtClean="0">
-                          <a:solidFill>
-                            <a:srgbClr val="23FF06"/>
-                          </a:solidFill>
-                        </a:rPr>
-                        <a:t>0.364</a:t>
-                      </a:r>
-                      <a:endParaRPr lang="en-US" sz="1800" dirty="0">
-                        <a:solidFill>
-                          <a:srgbClr val="23FF06"/>
-                        </a:solidFill>
-                      </a:endParaRPr>
-                    </a:p>
-                  </a:txBody>
-                  <a:tcPr anchor="ctr"/>
-                </a:tc>
-                <a:tc>
-                  <a:txBody>
-                    <a:bodyPr/>
-                    <a:lstStyle/>
-                    <a:p>
-                      <a:pPr algn="ctr"/>
-                      <a:r>
-                        <a:rPr lang="en-US" sz="1800" dirty="0" smtClean="0">
-                          <a:solidFill>
-                            <a:srgbClr val="0000FF"/>
-                          </a:solidFill>
-                        </a:rPr>
-                        <a:t>0</a:t>
-                      </a:r>
-                      <a:endParaRPr lang="en-US" sz="1800" dirty="0">
-                        <a:solidFill>
-                          <a:srgbClr val="0000FF"/>
-                        </a:solidFill>
-                      </a:endParaRPr>
-                    </a:p>
-                  </a:txBody>
-                  <a:tcPr anchor="ctr"/>
-                </a:tc>
-              </a:tr>
-            </a:tbl>
-          </a:graphicData>
-        </a:graphic>
-      </p:graphicFrame>
-      <p:graphicFrame>
-        <p:nvGraphicFramePr>
-          <p:cNvPr id="9" name="Table 8"/>
-          <p:cNvGraphicFramePr>
-            <a:graphicFrameLocks noGrp="1"/>
-          </p:cNvGraphicFramePr>
-          <p:nvPr>
-            <p:extLst>
-              <p:ext uri="{D42A27DB-BD31-4B8C-83A1-F6EECF244321}">
-                <p14:modId xmlns:p14="http://schemas.microsoft.com/office/powerpoint/2010/main" val="3276923398"/>
-              </p:ext>
-            </p:extLst>
-          </p:nvPr>
-        </p:nvGraphicFramePr>
-        <p:xfrm>
-          <a:off x="1082278" y="2715720"/>
-          <a:ext cx="2278608" cy="848620"/>
-        </p:xfrm>
-        <a:graphic>
-          <a:graphicData uri="http://schemas.openxmlformats.org/drawingml/2006/table">
-            <a:tbl>
-              <a:tblPr firstRow="1" bandRow="1">
-                <a:tableStyleId>{E929F9F4-4A8F-4326-A1B4-22849713DDAB}</a:tableStyleId>
-              </a:tblPr>
-              <a:tblGrid>
-                <a:gridCol w="759536"/>
-                <a:gridCol w="759536"/>
-                <a:gridCol w="759536"/>
-              </a:tblGrid>
-              <a:tr h="424310">
-                <a:tc>
-                  <a:txBody>
-                    <a:bodyPr/>
-                    <a:lstStyle/>
-                    <a:p>
-                      <a:pPr algn="ctr"/>
-                      <a:r>
-                        <a:rPr lang="en-US" sz="1800" dirty="0" smtClean="0">
-                          <a:solidFill>
-                            <a:srgbClr val="FF0000"/>
-                          </a:solidFill>
-                        </a:rPr>
-                        <a:t>red</a:t>
-                      </a:r>
-                      <a:endParaRPr lang="en-US" sz="1800" dirty="0">
-                        <a:solidFill>
-                          <a:srgbClr val="FF0000"/>
-                        </a:solidFill>
-                      </a:endParaRPr>
-                    </a:p>
-                  </a:txBody>
-                  <a:tcPr anchor="ctr"/>
-                </a:tc>
-                <a:tc>
-                  <a:txBody>
-                    <a:bodyPr/>
-                    <a:lstStyle/>
-                    <a:p>
-                      <a:pPr algn="ctr"/>
-                      <a:r>
-                        <a:rPr lang="en-US" sz="1800" dirty="0" smtClean="0">
-                          <a:solidFill>
-                            <a:srgbClr val="23FF06"/>
-                          </a:solidFill>
-                        </a:rPr>
-                        <a:t>green</a:t>
-                      </a:r>
-                      <a:endParaRPr lang="en-US" sz="1800" dirty="0">
-                        <a:solidFill>
-                          <a:srgbClr val="23FF06"/>
-                        </a:solidFill>
-                      </a:endParaRPr>
-                    </a:p>
-                  </a:txBody>
-                  <a:tcPr anchor="ctr"/>
-                </a:tc>
-                <a:tc>
-                  <a:txBody>
-                    <a:bodyPr/>
-                    <a:lstStyle/>
-                    <a:p>
-                      <a:pPr algn="ctr"/>
-                      <a:r>
-                        <a:rPr lang="en-US" sz="1800" dirty="0" smtClean="0">
-                          <a:solidFill>
-                            <a:srgbClr val="0000FF"/>
-                          </a:solidFill>
-                        </a:rPr>
-                        <a:t>blue</a:t>
-                      </a:r>
-                      <a:endParaRPr lang="en-US" sz="1800" dirty="0">
-                        <a:solidFill>
-                          <a:srgbClr val="0000FF"/>
-                        </a:solidFill>
-                      </a:endParaRPr>
-                    </a:p>
-                  </a:txBody>
-                  <a:tcPr anchor="ctr"/>
-                </a:tc>
-              </a:tr>
-              <a:tr h="424310">
-                <a:tc>
-                  <a:txBody>
-                    <a:bodyPr/>
-                    <a:lstStyle/>
-                    <a:p>
-                      <a:pPr algn="ctr"/>
-                      <a:r>
-                        <a:rPr lang="en-US" sz="1800" dirty="0" smtClean="0">
-                          <a:solidFill>
-                            <a:srgbClr val="FF0000"/>
-                          </a:solidFill>
-                        </a:rPr>
-                        <a:t>0.467</a:t>
-                      </a:r>
-                      <a:endParaRPr lang="en-US" sz="1800" dirty="0">
-                        <a:solidFill>
-                          <a:srgbClr val="FF0000"/>
-                        </a:solidFill>
-                      </a:endParaRPr>
-                    </a:p>
-                  </a:txBody>
-                  <a:tcPr anchor="ctr"/>
-                </a:tc>
-                <a:tc>
-                  <a:txBody>
-                    <a:bodyPr/>
-                    <a:lstStyle/>
-                    <a:p>
-                      <a:pPr algn="ctr"/>
-                      <a:r>
-                        <a:rPr lang="en-US" sz="1800" dirty="0" smtClean="0">
-                          <a:solidFill>
-                            <a:srgbClr val="23FF06"/>
-                          </a:solidFill>
-                        </a:rPr>
-                        <a:t>0.267</a:t>
-                      </a:r>
-                      <a:endParaRPr lang="en-US" sz="1800" dirty="0">
-                        <a:solidFill>
-                          <a:srgbClr val="23FF06"/>
-                        </a:solidFill>
-                      </a:endParaRPr>
-                    </a:p>
-                  </a:txBody>
-                  <a:tcPr anchor="ctr"/>
-                </a:tc>
-                <a:tc>
-                  <a:txBody>
-                    <a:bodyPr/>
-                    <a:lstStyle/>
-                    <a:p>
-                      <a:pPr algn="ctr"/>
-                      <a:r>
-                        <a:rPr lang="en-US" sz="1800" dirty="0" smtClean="0">
-                          <a:solidFill>
-                            <a:srgbClr val="0000FF"/>
-                          </a:solidFill>
-                        </a:rPr>
-                        <a:t>0.267</a:t>
-                      </a:r>
-                      <a:endParaRPr lang="en-US" sz="1800" dirty="0">
-                        <a:solidFill>
-                          <a:srgbClr val="0000FF"/>
-                        </a:solidFill>
-                      </a:endParaRPr>
-                    </a:p>
-                  </a:txBody>
-                  <a:tcPr anchor="ctr"/>
-                </a:tc>
-              </a:tr>
-            </a:tbl>
-          </a:graphicData>
-        </a:graphic>
-      </p:graphicFrame>
-      <p:sp>
-        <p:nvSpPr>
-          <p:cNvPr id="10" name="TextBox 9"/>
-          <p:cNvSpPr txBox="1"/>
-          <p:nvPr/>
-        </p:nvSpPr>
-        <p:spPr>
-          <a:xfrm>
-            <a:off x="0" y="2346388"/>
-            <a:ext cx="2980353" cy="369332"/>
-          </a:xfrm>
-          <a:prstGeom prst="rect">
-            <a:avLst/>
-          </a:prstGeom>
-          <a:noFill/>
-        </p:spPr>
-        <p:txBody>
-          <a:bodyPr wrap="none" rtlCol="0">
-            <a:spAutoFit/>
-          </a:bodyPr>
-          <a:lstStyle/>
-          <a:p>
-            <a:r>
-              <a:rPr lang="en-US" dirty="0" smtClean="0"/>
-              <a:t>Transcript relative abundance</a:t>
-            </a:r>
-            <a:endParaRPr lang="en-US" dirty="0"/>
-          </a:p>
-        </p:txBody>
-      </p:sp>
-      <p:sp>
-        <p:nvSpPr>
-          <p:cNvPr id="11" name="TextBox 10"/>
-          <p:cNvSpPr txBox="1"/>
-          <p:nvPr/>
-        </p:nvSpPr>
-        <p:spPr>
-          <a:xfrm>
-            <a:off x="0" y="3561644"/>
-            <a:ext cx="4045812" cy="369332"/>
-          </a:xfrm>
-          <a:prstGeom prst="rect">
-            <a:avLst/>
-          </a:prstGeom>
-          <a:noFill/>
-        </p:spPr>
-        <p:txBody>
-          <a:bodyPr wrap="none" rtlCol="0">
-            <a:spAutoFit/>
-          </a:bodyPr>
-          <a:lstStyle/>
-          <a:p>
-            <a:r>
-              <a:rPr lang="en-US" dirty="0" smtClean="0"/>
-              <a:t>Probability of read assigning to transcript</a:t>
-            </a:r>
-            <a:endParaRPr lang="en-US" dirty="0"/>
-          </a:p>
-        </p:txBody>
-      </p:sp>
-      <p:sp>
-        <p:nvSpPr>
-          <p:cNvPr id="15" name="Title 1"/>
-          <p:cNvSpPr>
-            <a:spLocks noGrp="1"/>
-          </p:cNvSpPr>
-          <p:nvPr>
-            <p:ph type="title"/>
-          </p:nvPr>
-        </p:nvSpPr>
-        <p:spPr>
-          <a:xfrm>
-            <a:off x="102462" y="0"/>
-            <a:ext cx="7886700" cy="1325563"/>
-          </a:xfrm>
-        </p:spPr>
-        <p:txBody>
-          <a:bodyPr>
-            <a:normAutofit/>
-          </a:bodyPr>
-          <a:lstStyle/>
-          <a:p>
-            <a:pPr algn="l"/>
-            <a:r>
-              <a:rPr lang="en-US" dirty="0" smtClean="0"/>
-              <a:t>Update read assignment</a:t>
-            </a:r>
-            <a:endParaRPr lang="en-US" dirty="0"/>
+            <a:pPr algn="ctr"/>
+            <a:endParaRPr lang="en-US"/>
           </a:p>
         </p:txBody>
       </p:sp>
@@ -12625,8 +14375,100 @@
         </p:nvSpPr>
         <p:spPr>
           <a:xfrm>
-            <a:off x="0" y="3599000"/>
-            <a:ext cx="4045812" cy="3150044"/>
+            <a:off x="5321927" y="2928730"/>
+            <a:ext cx="3797790" cy="1002246"/>
+          </a:xfrm>
+          <a:prstGeom prst="rect">
+            <a:avLst/>
+          </a:prstGeom>
+          <a:solidFill>
+            <a:schemeClr val="bg1"/>
+          </a:solidFill>
+          <a:ln>
+            <a:noFill/>
+          </a:ln>
+        </p:spPr>
+        <p:style>
+          <a:lnRef idx="2">
+            <a:schemeClr val="accent1">
+              <a:shade val="50000"/>
+            </a:schemeClr>
+          </a:lnRef>
+          <a:fillRef idx="1">
+            <a:schemeClr val="accent1"/>
+          </a:fillRef>
+          <a:effectRef idx="0">
+            <a:schemeClr val="accent1"/>
+          </a:effectRef>
+          <a:fontRef idx="minor">
+            <a:schemeClr val="lt1"/>
+          </a:fontRef>
+        </p:style>
+        <p:txBody>
+          <a:bodyPr rtlCol="0" anchor="ctr"/>
+          <a:lstStyle/>
+          <a:p>
+            <a:pPr algn="ctr"/>
+            <a:endParaRPr lang="en-US"/>
+          </a:p>
+        </p:txBody>
+      </p:sp>
+      <p:sp>
+        <p:nvSpPr>
+          <p:cNvPr id="17" name="Rectangle 16"/>
+          <p:cNvSpPr/>
+          <p:nvPr/>
+        </p:nvSpPr>
+        <p:spPr>
+          <a:xfrm>
+            <a:off x="6266807" y="2430010"/>
+            <a:ext cx="2447247" cy="1002246"/>
+          </a:xfrm>
+          <a:prstGeom prst="rect">
+            <a:avLst/>
+          </a:prstGeom>
+          <a:solidFill>
+            <a:schemeClr val="bg1"/>
+          </a:solidFill>
+          <a:ln>
+            <a:noFill/>
+          </a:ln>
+        </p:spPr>
+        <p:style>
+          <a:lnRef idx="2">
+            <a:schemeClr val="accent1">
+              <a:shade val="50000"/>
+            </a:schemeClr>
+          </a:lnRef>
+          <a:fillRef idx="1">
+            <a:schemeClr val="accent1"/>
+          </a:fillRef>
+          <a:effectRef idx="0">
+            <a:schemeClr val="accent1"/>
+          </a:effectRef>
+          <a:fontRef idx="minor">
+            <a:schemeClr val="lt1"/>
+          </a:fontRef>
+        </p:style>
+        <p:txBody>
+          <a:bodyPr rtlCol="0" anchor="ctr"/>
+          <a:lstStyle/>
+          <a:p>
+            <a:pPr algn="ctr"/>
+            <a:endParaRPr lang="en-US"/>
+          </a:p>
+        </p:txBody>
+      </p:sp>
+      <p:sp>
+        <p:nvSpPr>
+          <p:cNvPr id="18" name="Rectangle 17"/>
+          <p:cNvSpPr/>
+          <p:nvPr/>
+        </p:nvSpPr>
+        <p:spPr>
+          <a:xfrm>
+            <a:off x="0" y="2408055"/>
+            <a:ext cx="3486393" cy="1206514"/>
           </a:xfrm>
           <a:prstGeom prst="rect">
             <a:avLst/>
@@ -12662,55 +14504,10 @@
           </a:p>
         </p:txBody>
       </p:sp>
-      <p:sp>
-        <p:nvSpPr>
-          <p:cNvPr id="17" name="Rectangle 16"/>
-          <p:cNvSpPr/>
-          <p:nvPr/>
-        </p:nvSpPr>
-        <p:spPr>
-          <a:xfrm>
-            <a:off x="6325314" y="2335376"/>
-            <a:ext cx="2017128" cy="1263624"/>
-          </a:xfrm>
-          <a:prstGeom prst="rect">
-            <a:avLst/>
-          </a:prstGeom>
-          <a:noFill/>
-          <a:ln w="28575" cmpd="sng">
-            <a:solidFill>
-              <a:srgbClr val="FF6600"/>
-            </a:solidFill>
-          </a:ln>
-          <a:effectLst/>
-        </p:spPr>
-        <p:style>
-          <a:lnRef idx="1">
-            <a:schemeClr val="accent1"/>
-          </a:lnRef>
-          <a:fillRef idx="3">
-            <a:schemeClr val="accent1"/>
-          </a:fillRef>
-          <a:effectRef idx="2">
-            <a:schemeClr val="accent1"/>
-          </a:effectRef>
-          <a:fontRef idx="minor">
-            <a:schemeClr val="lt1"/>
-          </a:fontRef>
-        </p:style>
-        <p:txBody>
-          <a:bodyPr rtlCol="0" anchor="ctr"/>
-          <a:lstStyle/>
-          <a:p>
-            <a:pPr algn="ctr"/>
-            <a:endParaRPr lang="en-US"/>
-          </a:p>
-        </p:txBody>
-      </p:sp>
     </p:spTree>
     <p:extLst>
       <p:ext uri="{BB962C8B-B14F-4D97-AF65-F5344CB8AC3E}">
-        <p14:creationId xmlns:p14="http://schemas.microsoft.com/office/powerpoint/2010/main" val="2433799354"/>
+        <p14:creationId xmlns:p14="http://schemas.microsoft.com/office/powerpoint/2010/main" val="3446328257"/>
       </p:ext>
     </p:extLst>
   </p:cSld>
@@ -12720,7 +14517,7 @@
   <p:timing>
     <p:tnLst>
       <p:par>
-        <p:cTn xmlns:p14="http://schemas.microsoft.com/office/powerpoint/2010/main" id="1" dur="indefinite" restart="never" nodeType="tmRoot"/>
+        <p:cTn id="1" dur="indefinite" restart="never" nodeType="tmRoot"/>
       </p:par>
     </p:tnLst>
   </p:timing>
@@ -12982,7 +14779,7 @@
   <a:extraClrSchemeLst/>
   <a:extLst>
     <a:ext uri="{05A4C25C-085E-4340-85A3-A5531E510DB2}">
-      <thm15:themeFamily xmlns:thm15="http://schemas.microsoft.com/office/thememl/2012/main" xmlns="" name="Office Theme" id="{62F939B6-93AF-4DB8-9C6B-D6C7DFDC589F}" vid="{4A3C46E8-61CC-4603-A589-7422A47A8E4A}"/>
+      <thm15:themeFamily xmlns:thm15="http://schemas.microsoft.com/office/thememl/2012/main" name="Office Theme" id="{62F939B6-93AF-4DB8-9C6B-D6C7DFDC589F}" vid="{4A3C46E8-61CC-4603-A589-7422A47A8E4A}"/>
     </a:ext>
   </a:extLst>
 </a:theme>

</xml_diff>